<commit_message>
Update intro to causality ppt
</commit_message>
<xml_diff>
--- a/modules/06 Causality/intro_to_causality.pptx
+++ b/modules/06 Causality/intro_to_causality.pptx
@@ -2,51 +2,52 @@
 <file path=ppt/presentation.xml><?xml version="1.0" encoding="utf-8"?>
 <p:presentation xmlns:a="http://schemas.openxmlformats.org/drawingml/2006/main" xmlns:r="http://schemas.openxmlformats.org/officeDocument/2006/relationships" xmlns:p="http://schemas.openxmlformats.org/presentationml/2006/main" saveSubsetFonts="1" autoCompressPictures="0">
   <p:sldMasterIdLst>
-    <p:sldMasterId id="2147483648" r:id="rId1"/>
+    <p:sldMasterId id="2147483648" r:id="rId4"/>
   </p:sldMasterIdLst>
   <p:notesMasterIdLst>
-    <p:notesMasterId r:id="rId41"/>
+    <p:notesMasterId r:id="rId45"/>
   </p:notesMasterIdLst>
   <p:sldIdLst>
-    <p:sldId id="256" r:id="rId2"/>
-    <p:sldId id="259" r:id="rId3"/>
-    <p:sldId id="508" r:id="rId4"/>
-    <p:sldId id="265" r:id="rId5"/>
-    <p:sldId id="274" r:id="rId6"/>
-    <p:sldId id="275" r:id="rId7"/>
-    <p:sldId id="276" r:id="rId8"/>
-    <p:sldId id="263" r:id="rId9"/>
-    <p:sldId id="277" r:id="rId10"/>
-    <p:sldId id="264" r:id="rId11"/>
-    <p:sldId id="279" r:id="rId12"/>
-    <p:sldId id="257" r:id="rId13"/>
-    <p:sldId id="280" r:id="rId14"/>
-    <p:sldId id="511" r:id="rId15"/>
-    <p:sldId id="509" r:id="rId16"/>
-    <p:sldId id="281" r:id="rId17"/>
-    <p:sldId id="282" r:id="rId18"/>
-    <p:sldId id="283" r:id="rId19"/>
-    <p:sldId id="284" r:id="rId20"/>
-    <p:sldId id="261" r:id="rId21"/>
-    <p:sldId id="285" r:id="rId22"/>
-    <p:sldId id="287" r:id="rId23"/>
-    <p:sldId id="288" r:id="rId24"/>
-    <p:sldId id="260" r:id="rId25"/>
-    <p:sldId id="289" r:id="rId26"/>
-    <p:sldId id="290" r:id="rId27"/>
-    <p:sldId id="291" r:id="rId28"/>
-    <p:sldId id="292" r:id="rId29"/>
-    <p:sldId id="293" r:id="rId30"/>
-    <p:sldId id="294" r:id="rId31"/>
-    <p:sldId id="270" r:id="rId32"/>
-    <p:sldId id="295" r:id="rId33"/>
-    <p:sldId id="296" r:id="rId34"/>
-    <p:sldId id="297" r:id="rId35"/>
-    <p:sldId id="298" r:id="rId36"/>
-    <p:sldId id="299" r:id="rId37"/>
-    <p:sldId id="300" r:id="rId38"/>
-    <p:sldId id="301" r:id="rId39"/>
-    <p:sldId id="302" r:id="rId40"/>
+    <p:sldId id="256" r:id="rId5"/>
+    <p:sldId id="512" r:id="rId6"/>
+    <p:sldId id="259" r:id="rId7"/>
+    <p:sldId id="508" r:id="rId8"/>
+    <p:sldId id="265" r:id="rId9"/>
+    <p:sldId id="274" r:id="rId10"/>
+    <p:sldId id="275" r:id="rId11"/>
+    <p:sldId id="276" r:id="rId12"/>
+    <p:sldId id="263" r:id="rId13"/>
+    <p:sldId id="277" r:id="rId14"/>
+    <p:sldId id="264" r:id="rId15"/>
+    <p:sldId id="279" r:id="rId16"/>
+    <p:sldId id="257" r:id="rId17"/>
+    <p:sldId id="280" r:id="rId18"/>
+    <p:sldId id="511" r:id="rId19"/>
+    <p:sldId id="509" r:id="rId20"/>
+    <p:sldId id="281" r:id="rId21"/>
+    <p:sldId id="282" r:id="rId22"/>
+    <p:sldId id="283" r:id="rId23"/>
+    <p:sldId id="284" r:id="rId24"/>
+    <p:sldId id="261" r:id="rId25"/>
+    <p:sldId id="285" r:id="rId26"/>
+    <p:sldId id="287" r:id="rId27"/>
+    <p:sldId id="288" r:id="rId28"/>
+    <p:sldId id="260" r:id="rId29"/>
+    <p:sldId id="289" r:id="rId30"/>
+    <p:sldId id="290" r:id="rId31"/>
+    <p:sldId id="291" r:id="rId32"/>
+    <p:sldId id="292" r:id="rId33"/>
+    <p:sldId id="293" r:id="rId34"/>
+    <p:sldId id="294" r:id="rId35"/>
+    <p:sldId id="270" r:id="rId36"/>
+    <p:sldId id="295" r:id="rId37"/>
+    <p:sldId id="296" r:id="rId38"/>
+    <p:sldId id="297" r:id="rId39"/>
+    <p:sldId id="298" r:id="rId40"/>
+    <p:sldId id="299" r:id="rId41"/>
+    <p:sldId id="300" r:id="rId42"/>
+    <p:sldId id="301" r:id="rId43"/>
+    <p:sldId id="302" r:id="rId44"/>
   </p:sldIdLst>
   <p:sldSz cx="12192000" cy="6858000"/>
   <p:notesSz cx="6858000" cy="9144000"/>
@@ -153,6 +154,12 @@
 </p:presentation>
 </file>
 
+<file path=ppt/authors.xml><?xml version="1.0" encoding="utf-8"?>
+<p188:authorLst xmlns:a="http://schemas.openxmlformats.org/drawingml/2006/main" xmlns:r="http://schemas.openxmlformats.org/officeDocument/2006/relationships" xmlns:p188="http://schemas.microsoft.com/office/powerpoint/2018/8/main">
+  <p188:author id="{322262F4-198F-1758-9380-73A8D5E26897}" name="Cannell, Michael B" initials="CMB" userId="S::michael.b.cannell@uth.tmc.edu::df291291-9ac9-42c2-a976-062f6e2ad9da" providerId="AD"/>
+</p188:authorLst>
+</file>
+
 <file path=ppt/commentAuthors.xml><?xml version="1.0" encoding="utf-8"?>
 <p:cmAuthorLst xmlns:a="http://schemas.openxmlformats.org/drawingml/2006/main" xmlns:r="http://schemas.openxmlformats.org/officeDocument/2006/relationships" xmlns:p="http://schemas.openxmlformats.org/presentationml/2006/main">
   <p:cmAuthor id="1" name="Cannell, Michael B" initials="CMB" lastIdx="8" clrIdx="0">
@@ -163,6 +170,80 @@
     </p:extLst>
   </p:cmAuthor>
 </p:cmAuthorLst>
+</file>
+
+<file path=ppt/revisionInfo.xml><?xml version="1.0" encoding="utf-8"?>
+<p1510:revInfo xmlns:a="http://schemas.openxmlformats.org/drawingml/2006/main" xmlns:r="http://schemas.openxmlformats.org/officeDocument/2006/relationships" xmlns:p1510="http://schemas.microsoft.com/office/powerpoint/2015/10/main">
+  <p1510:revLst>
+    <p1510:client id="{CE3A9411-15F4-CF4B-939B-942C367E06D5}" v="1" dt="2022-09-25T17:01:50.223"/>
+  </p1510:revLst>
+</p1510:revInfo>
+</file>
+
+<file path=ppt/changesInfos/changesInfo1.xml><?xml version="1.0" encoding="utf-8"?>
+<pc:chgInfo xmlns:a="http://schemas.openxmlformats.org/drawingml/2006/main" xmlns:r="http://schemas.openxmlformats.org/officeDocument/2006/relationships" xmlns:ac="http://schemas.microsoft.com/office/drawing/2013/main/command" xmlns:pc="http://schemas.microsoft.com/office/powerpoint/2013/main/command">
+  <pc:docChgLst>
+    <pc:chgData name="Cannell, Michael B" userId="df291291-9ac9-42c2-a976-062f6e2ad9da" providerId="ADAL" clId="{CE3A9411-15F4-CF4B-939B-942C367E06D5}"/>
+    <pc:docChg chg="undo custSel addSld modSld">
+      <pc:chgData name="Cannell, Michael B" userId="df291291-9ac9-42c2-a976-062f6e2ad9da" providerId="ADAL" clId="{CE3A9411-15F4-CF4B-939B-942C367E06D5}" dt="2022-09-25T17:05:56.278" v="456" actId="114"/>
+      <pc:docMkLst>
+        <pc:docMk/>
+      </pc:docMkLst>
+      <pc:sldChg chg="addSp modSp new mod addCm">
+        <pc:chgData name="Cannell, Michael B" userId="df291291-9ac9-42c2-a976-062f6e2ad9da" providerId="ADAL" clId="{CE3A9411-15F4-CF4B-939B-942C367E06D5}" dt="2022-09-25T17:05:56.278" v="456" actId="114"/>
+        <pc:sldMkLst>
+          <pc:docMk/>
+          <pc:sldMk cId="3147338565" sldId="512"/>
+        </pc:sldMkLst>
+        <pc:spChg chg="mod">
+          <ac:chgData name="Cannell, Michael B" userId="df291291-9ac9-42c2-a976-062f6e2ad9da" providerId="ADAL" clId="{CE3A9411-15F4-CF4B-939B-942C367E06D5}" dt="2022-09-25T17:00:54.041" v="10" actId="20577"/>
+          <ac:spMkLst>
+            <pc:docMk/>
+            <pc:sldMk cId="3147338565" sldId="512"/>
+            <ac:spMk id="2" creationId="{EA0EA245-5F77-BE04-A076-3CAA760DDC77}"/>
+          </ac:spMkLst>
+        </pc:spChg>
+        <pc:spChg chg="mod">
+          <ac:chgData name="Cannell, Michael B" userId="df291291-9ac9-42c2-a976-062f6e2ad9da" providerId="ADAL" clId="{CE3A9411-15F4-CF4B-939B-942C367E06D5}" dt="2022-09-25T17:05:56.278" v="456" actId="114"/>
+          <ac:spMkLst>
+            <pc:docMk/>
+            <pc:sldMk cId="3147338565" sldId="512"/>
+            <ac:spMk id="3" creationId="{DC9294FC-4B1D-3BAB-E278-6DDF1D45A598}"/>
+          </ac:spMkLst>
+        </pc:spChg>
+        <pc:spChg chg="add mod">
+          <ac:chgData name="Cannell, Michael B" userId="df291291-9ac9-42c2-a976-062f6e2ad9da" providerId="ADAL" clId="{CE3A9411-15F4-CF4B-939B-942C367E06D5}" dt="2022-09-25T17:03:23.841" v="88" actId="20577"/>
+          <ac:spMkLst>
+            <pc:docMk/>
+            <pc:sldMk cId="3147338565" sldId="512"/>
+            <ac:spMk id="4" creationId="{6E1E42DA-2E63-281D-51B2-92B81A790D9D}"/>
+          </ac:spMkLst>
+        </pc:spChg>
+      </pc:sldChg>
+    </pc:docChg>
+  </pc:docChgLst>
+</pc:chgInfo>
+</file>
+
+<file path=ppt/comments/modernComment_200_BB989345.xml><?xml version="1.0" encoding="utf-8"?>
+<p188:cmLst xmlns:a="http://schemas.openxmlformats.org/drawingml/2006/main" xmlns:r="http://schemas.openxmlformats.org/officeDocument/2006/relationships" xmlns:p188="http://schemas.microsoft.com/office/powerpoint/2018/8/main">
+  <p188:cm id="{A95B09B7-2123-3746-B627-713414F7431F}" authorId="{322262F4-198F-1758-9380-73A8D5E26897}" created="2022-09-25T17:01:38.241">
+    <pc:sldMkLst xmlns:pc="http://schemas.microsoft.com/office/powerpoint/2013/main/command">
+      <pc:docMk/>
+      <pc:sldMk cId="3147338565" sldId="512"/>
+    </pc:sldMkLst>
+    <p188:txBody>
+      <a:bodyPr/>
+      <a:lstStyle/>
+      <a:p>
+        <a:r>
+          <a:rPr lang="en-US"/>
+          <a:t>Jotted this down really quickly while reading the BOW. Refine it an adjust its location when you have time. </a:t>
+        </a:r>
+      </a:p>
+    </p188:txBody>
+  </p188:cm>
+</p188:cmLst>
 </file>
 
 <file path=ppt/diagrams/colors1.xml><?xml version="1.0" encoding="utf-8"?>
@@ -3411,7 +3492,7 @@
           <a:p>
             <a:fld id="{E91DE993-E6A3-E849-86E1-AFF47A1BBBDD}" type="datetimeFigureOut">
               <a:rPr lang="en-US" smtClean="0"/>
-              <a:t>10/27/21</a:t>
+              <a:t>9/25/22</a:t>
             </a:fld>
             <a:endParaRPr lang="en-US"/>
           </a:p>
@@ -3851,7 +3932,7 @@
           <a:p>
             <a:fld id="{A04CC895-3B19-1948-8213-A5CD87C5981C}" type="slidenum">
               <a:rPr lang="en-US" smtClean="0"/>
-              <a:t>10</a:t>
+              <a:t>11</a:t>
             </a:fld>
             <a:endParaRPr lang="en-US"/>
           </a:p>
@@ -4136,7 +4217,7 @@
           <a:p>
             <a:fld id="{A04CC895-3B19-1948-8213-A5CD87C5981C}" type="slidenum">
               <a:rPr lang="en-US" smtClean="0"/>
-              <a:t>11</a:t>
+              <a:t>12</a:t>
             </a:fld>
             <a:endParaRPr lang="en-US"/>
           </a:p>
@@ -4249,7 +4330,7 @@
           <a:p>
             <a:fld id="{A04CC895-3B19-1948-8213-A5CD87C5981C}" type="slidenum">
               <a:rPr lang="en-US" smtClean="0"/>
-              <a:t>12</a:t>
+              <a:t>13</a:t>
             </a:fld>
             <a:endParaRPr lang="en-US"/>
           </a:p>
@@ -4336,7 +4417,7 @@
           <a:p>
             <a:fld id="{A04CC895-3B19-1948-8213-A5CD87C5981C}" type="slidenum">
               <a:rPr lang="en-US" smtClean="0"/>
-              <a:t>13</a:t>
+              <a:t>14</a:t>
             </a:fld>
             <a:endParaRPr lang="en-US"/>
           </a:p>
@@ -4420,7 +4501,7 @@
           <a:p>
             <a:fld id="{A04CC895-3B19-1948-8213-A5CD87C5981C}" type="slidenum">
               <a:rPr lang="en-US" smtClean="0"/>
-              <a:t>14</a:t>
+              <a:t>15</a:t>
             </a:fld>
             <a:endParaRPr lang="en-US"/>
           </a:p>
@@ -4504,7 +4585,7 @@
           <a:p>
             <a:fld id="{A04CC895-3B19-1948-8213-A5CD87C5981C}" type="slidenum">
               <a:rPr lang="en-US" smtClean="0"/>
-              <a:t>16</a:t>
+              <a:t>17</a:t>
             </a:fld>
             <a:endParaRPr lang="en-US"/>
           </a:p>
@@ -4695,7 +4776,7 @@
           <a:p>
             <a:fld id="{A04CC895-3B19-1948-8213-A5CD87C5981C}" type="slidenum">
               <a:rPr lang="en-US" smtClean="0"/>
-              <a:t>17</a:t>
+              <a:t>18</a:t>
             </a:fld>
             <a:endParaRPr lang="en-US"/>
           </a:p>
@@ -4799,7 +4880,7 @@
           <a:p>
             <a:fld id="{A04CC895-3B19-1948-8213-A5CD87C5981C}" type="slidenum">
               <a:rPr lang="en-US" smtClean="0"/>
-              <a:t>18</a:t>
+              <a:t>19</a:t>
             </a:fld>
             <a:endParaRPr lang="en-US"/>
           </a:p>
@@ -4906,7 +4987,7 @@
           <a:p>
             <a:fld id="{A04CC895-3B19-1948-8213-A5CD87C5981C}" type="slidenum">
               <a:rPr lang="en-US" smtClean="0"/>
-              <a:t>19</a:t>
+              <a:t>20</a:t>
             </a:fld>
             <a:endParaRPr lang="en-US"/>
           </a:p>
@@ -5043,7 +5124,7 @@
           <a:p>
             <a:fld id="{A04CC895-3B19-1948-8213-A5CD87C5981C}" type="slidenum">
               <a:rPr lang="en-US" smtClean="0"/>
-              <a:t>20</a:t>
+              <a:t>21</a:t>
             </a:fld>
             <a:endParaRPr lang="en-US"/>
           </a:p>
@@ -5228,7 +5309,7 @@
           <a:p>
             <a:fld id="{A04CC895-3B19-1948-8213-A5CD87C5981C}" type="slidenum">
               <a:rPr lang="en-US" smtClean="0"/>
-              <a:t>2</a:t>
+              <a:t>3</a:t>
             </a:fld>
             <a:endParaRPr lang="en-US"/>
           </a:p>
@@ -5339,7 +5420,7 @@
           <a:p>
             <a:fld id="{A04CC895-3B19-1948-8213-A5CD87C5981C}" type="slidenum">
               <a:rPr lang="en-US" smtClean="0"/>
-              <a:t>21</a:t>
+              <a:t>22</a:t>
             </a:fld>
             <a:endParaRPr lang="en-US"/>
           </a:p>
@@ -5435,7 +5516,7 @@
           <a:p>
             <a:fld id="{A04CC895-3B19-1948-8213-A5CD87C5981C}" type="slidenum">
               <a:rPr lang="en-US" smtClean="0"/>
-              <a:t>22</a:t>
+              <a:t>23</a:t>
             </a:fld>
             <a:endParaRPr lang="en-US"/>
           </a:p>
@@ -5540,7 +5621,7 @@
           <a:p>
             <a:fld id="{A04CC895-3B19-1948-8213-A5CD87C5981C}" type="slidenum">
               <a:rPr lang="en-US" smtClean="0"/>
-              <a:t>23</a:t>
+              <a:t>24</a:t>
             </a:fld>
             <a:endParaRPr lang="en-US"/>
           </a:p>
@@ -5645,7 +5726,7 @@
           <a:p>
             <a:fld id="{A04CC895-3B19-1948-8213-A5CD87C5981C}" type="slidenum">
               <a:rPr lang="en-US" smtClean="0"/>
-              <a:t>24</a:t>
+              <a:t>25</a:t>
             </a:fld>
             <a:endParaRPr lang="en-US"/>
           </a:p>
@@ -5732,7 +5813,7 @@
           <a:p>
             <a:fld id="{A04CC895-3B19-1948-8213-A5CD87C5981C}" type="slidenum">
               <a:rPr lang="en-US" smtClean="0"/>
-              <a:t>25</a:t>
+              <a:t>26</a:t>
             </a:fld>
             <a:endParaRPr lang="en-US"/>
           </a:p>
@@ -5819,7 +5900,7 @@
           <a:p>
             <a:fld id="{A04CC895-3B19-1948-8213-A5CD87C5981C}" type="slidenum">
               <a:rPr lang="en-US" smtClean="0"/>
-              <a:t>26</a:t>
+              <a:t>27</a:t>
             </a:fld>
             <a:endParaRPr lang="en-US"/>
           </a:p>
@@ -5923,7 +6004,7 @@
           <a:p>
             <a:fld id="{A04CC895-3B19-1948-8213-A5CD87C5981C}" type="slidenum">
               <a:rPr lang="en-US" smtClean="0"/>
-              <a:t>27</a:t>
+              <a:t>28</a:t>
             </a:fld>
             <a:endParaRPr lang="en-US"/>
           </a:p>
@@ -6027,7 +6108,7 @@
           <a:p>
             <a:fld id="{A04CC895-3B19-1948-8213-A5CD87C5981C}" type="slidenum">
               <a:rPr lang="en-US" smtClean="0"/>
-              <a:t>28</a:t>
+              <a:t>29</a:t>
             </a:fld>
             <a:endParaRPr lang="en-US"/>
           </a:p>
@@ -6174,7 +6255,7 @@
           <a:p>
             <a:fld id="{A04CC895-3B19-1948-8213-A5CD87C5981C}" type="slidenum">
               <a:rPr lang="en-US" smtClean="0"/>
-              <a:t>29</a:t>
+              <a:t>30</a:t>
             </a:fld>
             <a:endParaRPr lang="en-US"/>
           </a:p>
@@ -6321,7 +6402,7 @@
           <a:p>
             <a:fld id="{A04CC895-3B19-1948-8213-A5CD87C5981C}" type="slidenum">
               <a:rPr lang="en-US" smtClean="0"/>
-              <a:t>30</a:t>
+              <a:t>31</a:t>
             </a:fld>
             <a:endParaRPr lang="en-US"/>
           </a:p>
@@ -6420,7 +6501,7 @@
           <a:p>
             <a:fld id="{A04CC895-3B19-1948-8213-A5CD87C5981C}" type="slidenum">
               <a:rPr lang="en-US" smtClean="0"/>
-              <a:t>3</a:t>
+              <a:t>4</a:t>
             </a:fld>
             <a:endParaRPr lang="en-US"/>
           </a:p>
@@ -6507,7 +6588,7 @@
           <a:p>
             <a:fld id="{A04CC895-3B19-1948-8213-A5CD87C5981C}" type="slidenum">
               <a:rPr lang="en-US" smtClean="0"/>
-              <a:t>31</a:t>
+              <a:t>32</a:t>
             </a:fld>
             <a:endParaRPr lang="en-US"/>
           </a:p>
@@ -6594,7 +6675,7 @@
           <a:p>
             <a:fld id="{A04CC895-3B19-1948-8213-A5CD87C5981C}" type="slidenum">
               <a:rPr lang="en-US" smtClean="0"/>
-              <a:t>32</a:t>
+              <a:t>33</a:t>
             </a:fld>
             <a:endParaRPr lang="en-US"/>
           </a:p>
@@ -6681,7 +6762,7 @@
           <a:p>
             <a:fld id="{A04CC895-3B19-1948-8213-A5CD87C5981C}" type="slidenum">
               <a:rPr lang="en-US" smtClean="0"/>
-              <a:t>33</a:t>
+              <a:t>34</a:t>
             </a:fld>
             <a:endParaRPr lang="en-US"/>
           </a:p>
@@ -6768,7 +6849,7 @@
           <a:p>
             <a:fld id="{A04CC895-3B19-1948-8213-A5CD87C5981C}" type="slidenum">
               <a:rPr lang="en-US" smtClean="0"/>
-              <a:t>34</a:t>
+              <a:t>35</a:t>
             </a:fld>
             <a:endParaRPr lang="en-US"/>
           </a:p>
@@ -6855,7 +6936,7 @@
           <a:p>
             <a:fld id="{A04CC895-3B19-1948-8213-A5CD87C5981C}" type="slidenum">
               <a:rPr lang="en-US" smtClean="0"/>
-              <a:t>35</a:t>
+              <a:t>36</a:t>
             </a:fld>
             <a:endParaRPr lang="en-US"/>
           </a:p>
@@ -6947,7 +7028,7 @@
           <a:p>
             <a:fld id="{A04CC895-3B19-1948-8213-A5CD87C5981C}" type="slidenum">
               <a:rPr lang="en-US" smtClean="0"/>
-              <a:t>36</a:t>
+              <a:t>37</a:t>
             </a:fld>
             <a:endParaRPr lang="en-US"/>
           </a:p>
@@ -7048,7 +7129,7 @@
           <a:p>
             <a:fld id="{A04CC895-3B19-1948-8213-A5CD87C5981C}" type="slidenum">
               <a:rPr lang="en-US" smtClean="0"/>
-              <a:t>38</a:t>
+              <a:t>39</a:t>
             </a:fld>
             <a:endParaRPr lang="en-US"/>
           </a:p>
@@ -7149,7 +7230,7 @@
           <a:p>
             <a:fld id="{A04CC895-3B19-1948-8213-A5CD87C5981C}" type="slidenum">
               <a:rPr lang="en-US" smtClean="0"/>
-              <a:t>39</a:t>
+              <a:t>40</a:t>
             </a:fld>
             <a:endParaRPr lang="en-US"/>
           </a:p>
@@ -7253,7 +7334,7 @@
           <a:p>
             <a:fld id="{A04CC895-3B19-1948-8213-A5CD87C5981C}" type="slidenum">
               <a:rPr lang="en-US" smtClean="0"/>
-              <a:t>4</a:t>
+              <a:t>5</a:t>
             </a:fld>
             <a:endParaRPr lang="en-US"/>
           </a:p>
@@ -7340,7 +7421,7 @@
           <a:p>
             <a:fld id="{A04CC895-3B19-1948-8213-A5CD87C5981C}" type="slidenum">
               <a:rPr lang="en-US" smtClean="0"/>
-              <a:t>5</a:t>
+              <a:t>6</a:t>
             </a:fld>
             <a:endParaRPr lang="en-US"/>
           </a:p>
@@ -7427,7 +7508,7 @@
           <a:p>
             <a:fld id="{A04CC895-3B19-1948-8213-A5CD87C5981C}" type="slidenum">
               <a:rPr lang="en-US" smtClean="0"/>
-              <a:t>6</a:t>
+              <a:t>7</a:t>
             </a:fld>
             <a:endParaRPr lang="en-US"/>
           </a:p>
@@ -7523,7 +7604,7 @@
           <a:p>
             <a:fld id="{A04CC895-3B19-1948-8213-A5CD87C5981C}" type="slidenum">
               <a:rPr lang="en-US" smtClean="0"/>
-              <a:t>7</a:t>
+              <a:t>8</a:t>
             </a:fld>
             <a:endParaRPr lang="en-US"/>
           </a:p>
@@ -7630,7 +7711,7 @@
           <a:p>
             <a:fld id="{A04CC895-3B19-1948-8213-A5CD87C5981C}" type="slidenum">
               <a:rPr lang="en-US" smtClean="0"/>
-              <a:t>8</a:t>
+              <a:t>9</a:t>
             </a:fld>
             <a:endParaRPr lang="en-US"/>
           </a:p>
@@ -7772,7 +7853,7 @@
           <a:p>
             <a:fld id="{A04CC895-3B19-1948-8213-A5CD87C5981C}" type="slidenum">
               <a:rPr lang="en-US" smtClean="0"/>
-              <a:t>9</a:t>
+              <a:t>10</a:t>
             </a:fld>
             <a:endParaRPr lang="en-US"/>
           </a:p>
@@ -7938,7 +8019,7 @@
           <a:p>
             <a:fld id="{97E5D4AC-B265-BC46-B8CB-964562500F15}" type="datetimeFigureOut">
               <a:rPr lang="en-US" smtClean="0"/>
-              <a:t>10/27/21</a:t>
+              <a:t>9/25/22</a:t>
             </a:fld>
             <a:endParaRPr lang="en-US"/>
           </a:p>
@@ -8136,7 +8217,7 @@
           <a:p>
             <a:fld id="{97E5D4AC-B265-BC46-B8CB-964562500F15}" type="datetimeFigureOut">
               <a:rPr lang="en-US" smtClean="0"/>
-              <a:t>10/27/21</a:t>
+              <a:t>9/25/22</a:t>
             </a:fld>
             <a:endParaRPr lang="en-US"/>
           </a:p>
@@ -8344,7 +8425,7 @@
           <a:p>
             <a:fld id="{97E5D4AC-B265-BC46-B8CB-964562500F15}" type="datetimeFigureOut">
               <a:rPr lang="en-US" smtClean="0"/>
-              <a:t>10/27/21</a:t>
+              <a:t>9/25/22</a:t>
             </a:fld>
             <a:endParaRPr lang="en-US"/>
           </a:p>
@@ -8542,7 +8623,7 @@
           <a:p>
             <a:fld id="{97E5D4AC-B265-BC46-B8CB-964562500F15}" type="datetimeFigureOut">
               <a:rPr lang="en-US" smtClean="0"/>
-              <a:t>10/27/21</a:t>
+              <a:t>9/25/22</a:t>
             </a:fld>
             <a:endParaRPr lang="en-US"/>
           </a:p>
@@ -8817,7 +8898,7 @@
           <a:p>
             <a:fld id="{97E5D4AC-B265-BC46-B8CB-964562500F15}" type="datetimeFigureOut">
               <a:rPr lang="en-US" smtClean="0"/>
-              <a:t>10/27/21</a:t>
+              <a:t>9/25/22</a:t>
             </a:fld>
             <a:endParaRPr lang="en-US"/>
           </a:p>
@@ -9082,7 +9163,7 @@
           <a:p>
             <a:fld id="{97E5D4AC-B265-BC46-B8CB-964562500F15}" type="datetimeFigureOut">
               <a:rPr lang="en-US" smtClean="0"/>
-              <a:t>10/27/21</a:t>
+              <a:t>9/25/22</a:t>
             </a:fld>
             <a:endParaRPr lang="en-US"/>
           </a:p>
@@ -9494,7 +9575,7 @@
           <a:p>
             <a:fld id="{97E5D4AC-B265-BC46-B8CB-964562500F15}" type="datetimeFigureOut">
               <a:rPr lang="en-US" smtClean="0"/>
-              <a:t>10/27/21</a:t>
+              <a:t>9/25/22</a:t>
             </a:fld>
             <a:endParaRPr lang="en-US"/>
           </a:p>
@@ -9635,7 +9716,7 @@
           <a:p>
             <a:fld id="{97E5D4AC-B265-BC46-B8CB-964562500F15}" type="datetimeFigureOut">
               <a:rPr lang="en-US" smtClean="0"/>
-              <a:t>10/27/21</a:t>
+              <a:t>9/25/22</a:t>
             </a:fld>
             <a:endParaRPr lang="en-US"/>
           </a:p>
@@ -9748,7 +9829,7 @@
           <a:p>
             <a:fld id="{97E5D4AC-B265-BC46-B8CB-964562500F15}" type="datetimeFigureOut">
               <a:rPr lang="en-US" smtClean="0"/>
-              <a:t>10/27/21</a:t>
+              <a:t>9/25/22</a:t>
             </a:fld>
             <a:endParaRPr lang="en-US"/>
           </a:p>
@@ -10059,7 +10140,7 @@
           <a:p>
             <a:fld id="{97E5D4AC-B265-BC46-B8CB-964562500F15}" type="datetimeFigureOut">
               <a:rPr lang="en-US" smtClean="0"/>
-              <a:t>10/27/21</a:t>
+              <a:t>9/25/22</a:t>
             </a:fld>
             <a:endParaRPr lang="en-US"/>
           </a:p>
@@ -10347,7 +10428,7 @@
           <a:p>
             <a:fld id="{97E5D4AC-B265-BC46-B8CB-964562500F15}" type="datetimeFigureOut">
               <a:rPr lang="en-US" smtClean="0"/>
-              <a:t>10/27/21</a:t>
+              <a:t>9/25/22</a:t>
             </a:fld>
             <a:endParaRPr lang="en-US"/>
           </a:p>
@@ -10588,7 +10669,7 @@
           <a:p>
             <a:fld id="{97E5D4AC-B265-BC46-B8CB-964562500F15}" type="datetimeFigureOut">
               <a:rPr lang="en-US" smtClean="0"/>
-              <a:t>10/27/21</a:t>
+              <a:t>9/25/22</a:t>
             </a:fld>
             <a:endParaRPr lang="en-US"/>
           </a:p>
@@ -11075,7 +11156,7 @@
           <p:cNvPr id="2" name="Title 1">
             <a:extLst>
               <a:ext uri="{FF2B5EF4-FFF2-40B4-BE49-F238E27FC236}">
-                <a16:creationId xmlns:a16="http://schemas.microsoft.com/office/drawing/2014/main" id="{EDE89E3F-8A33-8649-8016-1A700394F562}"/>
+                <a16:creationId xmlns:a16="http://schemas.microsoft.com/office/drawing/2014/main" id="{D6CEF004-6FA2-2B4C-A7D4-9FE1D55D54E3}"/>
               </a:ext>
             </a:extLst>
           </p:cNvPr>
@@ -11093,7 +11174,7 @@
           <a:p>
             <a:r>
               <a:rPr lang="en-US" dirty="0"/>
-              <a:t>Causation</a:t>
+              <a:t>Prediction</a:t>
             </a:r>
           </a:p>
         </p:txBody>
@@ -11103,7 +11184,7 @@
           <p:cNvPr id="3" name="Content Placeholder 2">
             <a:extLst>
               <a:ext uri="{FF2B5EF4-FFF2-40B4-BE49-F238E27FC236}">
-                <a16:creationId xmlns:a16="http://schemas.microsoft.com/office/drawing/2014/main" id="{CA7999F8-CE57-244B-B7EF-CA442173B2DD}"/>
+                <a16:creationId xmlns:a16="http://schemas.microsoft.com/office/drawing/2014/main" id="{293C1495-F7DB-D94C-8997-52357CAEE529}"/>
               </a:ext>
             </a:extLst>
           </p:cNvPr>
@@ -11116,27 +11197,72 @@
         </p:nvSpPr>
         <p:spPr/>
         <p:txBody>
-          <a:bodyPr/>
+          <a:bodyPr>
+            <a:normAutofit lnSpcReduction="10000"/>
+          </a:bodyPr>
           <a:lstStyle/>
           <a:p>
             <a:r>
               <a:rPr lang="en-US" dirty="0"/>
-              <a:t>Believe it or not there is legitimate debate about whether or not causation is even a thing.</a:t>
+              <a:t>Implies associations.</a:t>
             </a:r>
           </a:p>
           <a:p>
             <a:r>
               <a:rPr lang="en-US" dirty="0"/>
-              <a:t>Let’s start with this assumption — things happen. </a:t>
-            </a:r>
-          </a:p>
-          <a:p>
+              <a:t>Examples</a:t>
+            </a:r>
+          </a:p>
+          <a:p>
+            <a:pPr lvl="1"/>
             <a:r>
               <a:rPr lang="en-US" dirty="0"/>
-              <a:t>Ok, but why do they happen? For example, “I got in a car wreck today.” That’s a thing. “Why did I get in a car wreck today?”</a:t>
-            </a:r>
-          </a:p>
-          <a:p>
+              <a:t>People of a certain race/ethnicity are more likely to get a particular cancer.</a:t>
+            </a:r>
+          </a:p>
+          <a:p>
+            <a:pPr lvl="1"/>
+            <a:r>
+              <a:rPr lang="en-US" dirty="0"/>
+              <a:t>Older adults who have trouble managing finances are more likely to get dementia.</a:t>
+            </a:r>
+          </a:p>
+          <a:p>
+            <a:r>
+              <a:rPr lang="en-US" dirty="0"/>
+              <a:t>Can be useful on its own.</a:t>
+            </a:r>
+          </a:p>
+          <a:p>
+            <a:r>
+              <a:rPr lang="en-US" dirty="0"/>
+              <a:t>Often, in epidemiology, the ultimate goal is causal inference.</a:t>
+            </a:r>
+          </a:p>
+          <a:p>
+            <a:r>
+              <a:rPr lang="en-US" dirty="0"/>
+              <a:t>“the study of the occurrence and distribution of health-related states or events in specified populations, including the study of the determinants influencing such states, </a:t>
+            </a:r>
+            <a:r>
+              <a:rPr lang="en-US" u="sng" dirty="0"/>
+              <a:t>and the application of this knowledge to control the health problems.</a:t>
+            </a:r>
+            <a:r>
+              <a:rPr lang="en-US" dirty="0"/>
+              <a:t>” </a:t>
+            </a:r>
+            <a:r>
+              <a:rPr lang="en-US" u="sng" dirty="0"/>
+              <a:t>(Porta 2008, page 81)</a:t>
+            </a:r>
+            <a:endParaRPr lang="en-US" dirty="0"/>
+          </a:p>
+          <a:p>
+            <a:endParaRPr lang="en-US" dirty="0"/>
+          </a:p>
+          <a:p>
+            <a:pPr lvl="1"/>
             <a:endParaRPr lang="en-US" dirty="0"/>
           </a:p>
         </p:txBody>
@@ -11144,7 +11270,7 @@
     </p:spTree>
     <p:extLst>
       <p:ext uri="{BB962C8B-B14F-4D97-AF65-F5344CB8AC3E}">
-        <p14:creationId xmlns:p14="http://schemas.microsoft.com/office/powerpoint/2010/main" val="3727521307"/>
+        <p14:creationId xmlns:p14="http://schemas.microsoft.com/office/powerpoint/2010/main" val="1469833745"/>
       </p:ext>
     </p:extLst>
   </p:cSld>
@@ -11217,6 +11343,107 @@
         </p:nvSpPr>
         <p:spPr/>
         <p:txBody>
+          <a:bodyPr/>
+          <a:lstStyle/>
+          <a:p>
+            <a:r>
+              <a:rPr lang="en-US" dirty="0"/>
+              <a:t>Believe it or not there is legitimate debate about whether or not causation is even a thing.</a:t>
+            </a:r>
+          </a:p>
+          <a:p>
+            <a:r>
+              <a:rPr lang="en-US" dirty="0"/>
+              <a:t>Let’s start with this assumption — things happen. </a:t>
+            </a:r>
+          </a:p>
+          <a:p>
+            <a:r>
+              <a:rPr lang="en-US" dirty="0"/>
+              <a:t>Ok, but why do they happen? For example, “I got in a car wreck today.” That’s a thing. “Why did I get in a car wreck today?”</a:t>
+            </a:r>
+          </a:p>
+          <a:p>
+            <a:endParaRPr lang="en-US" dirty="0"/>
+          </a:p>
+        </p:txBody>
+      </p:sp>
+    </p:spTree>
+    <p:extLst>
+      <p:ext uri="{BB962C8B-B14F-4D97-AF65-F5344CB8AC3E}">
+        <p14:creationId xmlns:p14="http://schemas.microsoft.com/office/powerpoint/2010/main" val="3727521307"/>
+      </p:ext>
+    </p:extLst>
+  </p:cSld>
+  <p:clrMapOvr>
+    <a:masterClrMapping/>
+  </p:clrMapOvr>
+</p:sld>
+</file>
+
+<file path=ppt/slides/slide12.xml><?xml version="1.0" encoding="utf-8"?>
+<p:sld xmlns:a="http://schemas.openxmlformats.org/drawingml/2006/main" xmlns:r="http://schemas.openxmlformats.org/officeDocument/2006/relationships" xmlns:p="http://schemas.openxmlformats.org/presentationml/2006/main">
+  <p:cSld>
+    <p:spTree>
+      <p:nvGrpSpPr>
+        <p:cNvPr id="1" name=""/>
+        <p:cNvGrpSpPr/>
+        <p:nvPr/>
+      </p:nvGrpSpPr>
+      <p:grpSpPr>
+        <a:xfrm>
+          <a:off x="0" y="0"/>
+          <a:ext cx="0" cy="0"/>
+          <a:chOff x="0" y="0"/>
+          <a:chExt cx="0" cy="0"/>
+        </a:xfrm>
+      </p:grpSpPr>
+      <p:sp>
+        <p:nvSpPr>
+          <p:cNvPr id="2" name="Title 1">
+            <a:extLst>
+              <a:ext uri="{FF2B5EF4-FFF2-40B4-BE49-F238E27FC236}">
+                <a16:creationId xmlns:a16="http://schemas.microsoft.com/office/drawing/2014/main" id="{EDE89E3F-8A33-8649-8016-1A700394F562}"/>
+              </a:ext>
+            </a:extLst>
+          </p:cNvPr>
+          <p:cNvSpPr>
+            <a:spLocks noGrp="1"/>
+          </p:cNvSpPr>
+          <p:nvPr>
+            <p:ph type="title"/>
+          </p:nvPr>
+        </p:nvSpPr>
+        <p:spPr/>
+        <p:txBody>
+          <a:bodyPr/>
+          <a:lstStyle/>
+          <a:p>
+            <a:r>
+              <a:rPr lang="en-US" dirty="0"/>
+              <a:t>Causation</a:t>
+            </a:r>
+          </a:p>
+        </p:txBody>
+      </p:sp>
+      <p:sp>
+        <p:nvSpPr>
+          <p:cNvPr id="3" name="Content Placeholder 2">
+            <a:extLst>
+              <a:ext uri="{FF2B5EF4-FFF2-40B4-BE49-F238E27FC236}">
+                <a16:creationId xmlns:a16="http://schemas.microsoft.com/office/drawing/2014/main" id="{CA7999F8-CE57-244B-B7EF-CA442173B2DD}"/>
+              </a:ext>
+            </a:extLst>
+          </p:cNvPr>
+          <p:cNvSpPr>
+            <a:spLocks noGrp="1"/>
+          </p:cNvSpPr>
+          <p:nvPr>
+            <p:ph idx="1"/>
+          </p:nvPr>
+        </p:nvSpPr>
+        <p:spPr/>
+        <p:txBody>
           <a:bodyPr>
             <a:normAutofit fontScale="92500" lnSpcReduction="20000"/>
           </a:bodyPr>
@@ -11312,7 +11539,7 @@
 </p:sld>
 </file>
 
-<file path=ppt/slides/slide12.xml><?xml version="1.0" encoding="utf-8"?>
+<file path=ppt/slides/slide13.xml><?xml version="1.0" encoding="utf-8"?>
 <p:sld xmlns:a="http://schemas.openxmlformats.org/drawingml/2006/main" xmlns:r="http://schemas.openxmlformats.org/officeDocument/2006/relationships" xmlns:p="http://schemas.openxmlformats.org/presentationml/2006/main">
   <p:cSld>
     <p:spTree>
@@ -11773,98 +12000,6 @@
 </p:sld>
 </file>
 
-<file path=ppt/slides/slide13.xml><?xml version="1.0" encoding="utf-8"?>
-<p:sld xmlns:a="http://schemas.openxmlformats.org/drawingml/2006/main" xmlns:r="http://schemas.openxmlformats.org/officeDocument/2006/relationships" xmlns:p="http://schemas.openxmlformats.org/presentationml/2006/main">
-  <p:cSld>
-    <p:spTree>
-      <p:nvGrpSpPr>
-        <p:cNvPr id="1" name=""/>
-        <p:cNvGrpSpPr/>
-        <p:nvPr/>
-      </p:nvGrpSpPr>
-      <p:grpSpPr>
-        <a:xfrm>
-          <a:off x="0" y="0"/>
-          <a:ext cx="0" cy="0"/>
-          <a:chOff x="0" y="0"/>
-          <a:chExt cx="0" cy="0"/>
-        </a:xfrm>
-      </p:grpSpPr>
-      <p:sp>
-        <p:nvSpPr>
-          <p:cNvPr id="2" name="Title 1">
-            <a:extLst>
-              <a:ext uri="{FF2B5EF4-FFF2-40B4-BE49-F238E27FC236}">
-                <a16:creationId xmlns:a16="http://schemas.microsoft.com/office/drawing/2014/main" id="{E634157E-EEDA-2D4E-81C5-5E8DF7F346CB}"/>
-              </a:ext>
-            </a:extLst>
-          </p:cNvPr>
-          <p:cNvSpPr>
-            <a:spLocks noGrp="1"/>
-          </p:cNvSpPr>
-          <p:nvPr>
-            <p:ph type="title"/>
-          </p:nvPr>
-        </p:nvSpPr>
-        <p:spPr/>
-        <p:txBody>
-          <a:bodyPr/>
-          <a:lstStyle/>
-          <a:p>
-            <a:r>
-              <a:rPr lang="en-US" dirty="0"/>
-              <a:t>Rothman’s model of sufficient and component causes (RMSCC)</a:t>
-            </a:r>
-          </a:p>
-        </p:txBody>
-      </p:sp>
-      <p:sp>
-        <p:nvSpPr>
-          <p:cNvPr id="3" name="Content Placeholder 2">
-            <a:extLst>
-              <a:ext uri="{FF2B5EF4-FFF2-40B4-BE49-F238E27FC236}">
-                <a16:creationId xmlns:a16="http://schemas.microsoft.com/office/drawing/2014/main" id="{0198EF66-E480-BB4B-9F0A-623A422CF0A3}"/>
-              </a:ext>
-            </a:extLst>
-          </p:cNvPr>
-          <p:cNvSpPr>
-            <a:spLocks noGrp="1"/>
-          </p:cNvSpPr>
-          <p:nvPr>
-            <p:ph idx="1"/>
-          </p:nvPr>
-        </p:nvSpPr>
-        <p:spPr/>
-        <p:txBody>
-          <a:bodyPr/>
-          <a:lstStyle/>
-          <a:p>
-            <a:r>
-              <a:rPr lang="en-US" dirty="0"/>
-              <a:t>Starts from the effect and works backwards to a set of causes</a:t>
-            </a:r>
-          </a:p>
-          <a:p>
-            <a:r>
-              <a:rPr lang="en-US" dirty="0"/>
-              <a:t>Answers the question: “Given a particular effect/outcome, what are the various events that might have been its cause?”</a:t>
-            </a:r>
-          </a:p>
-        </p:txBody>
-      </p:sp>
-    </p:spTree>
-    <p:extLst>
-      <p:ext uri="{BB962C8B-B14F-4D97-AF65-F5344CB8AC3E}">
-        <p14:creationId xmlns:p14="http://schemas.microsoft.com/office/powerpoint/2010/main" val="2713288566"/>
-      </p:ext>
-    </p:extLst>
-  </p:cSld>
-  <p:clrMapOvr>
-    <a:masterClrMapping/>
-  </p:clrMapOvr>
-</p:sld>
-</file>
-
 <file path=ppt/slides/slide14.xml><?xml version="1.0" encoding="utf-8"?>
 <p:sld xmlns:a="http://schemas.openxmlformats.org/drawingml/2006/main" xmlns:r="http://schemas.openxmlformats.org/officeDocument/2006/relationships" xmlns:p="http://schemas.openxmlformats.org/presentationml/2006/main">
   <p:cSld>
@@ -11887,6 +12022,98 @@
           <p:cNvPr id="2" name="Title 1">
             <a:extLst>
               <a:ext uri="{FF2B5EF4-FFF2-40B4-BE49-F238E27FC236}">
+                <a16:creationId xmlns:a16="http://schemas.microsoft.com/office/drawing/2014/main" id="{E634157E-EEDA-2D4E-81C5-5E8DF7F346CB}"/>
+              </a:ext>
+            </a:extLst>
+          </p:cNvPr>
+          <p:cNvSpPr>
+            <a:spLocks noGrp="1"/>
+          </p:cNvSpPr>
+          <p:nvPr>
+            <p:ph type="title"/>
+          </p:nvPr>
+        </p:nvSpPr>
+        <p:spPr/>
+        <p:txBody>
+          <a:bodyPr/>
+          <a:lstStyle/>
+          <a:p>
+            <a:r>
+              <a:rPr lang="en-US" dirty="0"/>
+              <a:t>Rothman’s model of sufficient and component causes (RMSCC)</a:t>
+            </a:r>
+          </a:p>
+        </p:txBody>
+      </p:sp>
+      <p:sp>
+        <p:nvSpPr>
+          <p:cNvPr id="3" name="Content Placeholder 2">
+            <a:extLst>
+              <a:ext uri="{FF2B5EF4-FFF2-40B4-BE49-F238E27FC236}">
+                <a16:creationId xmlns:a16="http://schemas.microsoft.com/office/drawing/2014/main" id="{0198EF66-E480-BB4B-9F0A-623A422CF0A3}"/>
+              </a:ext>
+            </a:extLst>
+          </p:cNvPr>
+          <p:cNvSpPr>
+            <a:spLocks noGrp="1"/>
+          </p:cNvSpPr>
+          <p:nvPr>
+            <p:ph idx="1"/>
+          </p:nvPr>
+        </p:nvSpPr>
+        <p:spPr/>
+        <p:txBody>
+          <a:bodyPr/>
+          <a:lstStyle/>
+          <a:p>
+            <a:r>
+              <a:rPr lang="en-US" dirty="0"/>
+              <a:t>Starts from the effect and works backwards to a set of causes</a:t>
+            </a:r>
+          </a:p>
+          <a:p>
+            <a:r>
+              <a:rPr lang="en-US" dirty="0"/>
+              <a:t>Answers the question: “Given a particular effect/outcome, what are the various events that might have been its cause?”</a:t>
+            </a:r>
+          </a:p>
+        </p:txBody>
+      </p:sp>
+    </p:spTree>
+    <p:extLst>
+      <p:ext uri="{BB962C8B-B14F-4D97-AF65-F5344CB8AC3E}">
+        <p14:creationId xmlns:p14="http://schemas.microsoft.com/office/powerpoint/2010/main" val="2713288566"/>
+      </p:ext>
+    </p:extLst>
+  </p:cSld>
+  <p:clrMapOvr>
+    <a:masterClrMapping/>
+  </p:clrMapOvr>
+</p:sld>
+</file>
+
+<file path=ppt/slides/slide15.xml><?xml version="1.0" encoding="utf-8"?>
+<p:sld xmlns:a="http://schemas.openxmlformats.org/drawingml/2006/main" xmlns:r="http://schemas.openxmlformats.org/officeDocument/2006/relationships" xmlns:p="http://schemas.openxmlformats.org/presentationml/2006/main">
+  <p:cSld>
+    <p:spTree>
+      <p:nvGrpSpPr>
+        <p:cNvPr id="1" name=""/>
+        <p:cNvGrpSpPr/>
+        <p:nvPr/>
+      </p:nvGrpSpPr>
+      <p:grpSpPr>
+        <a:xfrm>
+          <a:off x="0" y="0"/>
+          <a:ext cx="0" cy="0"/>
+          <a:chOff x="0" y="0"/>
+          <a:chExt cx="0" cy="0"/>
+        </a:xfrm>
+      </p:grpSpPr>
+      <p:sp>
+        <p:nvSpPr>
+          <p:cNvPr id="2" name="Title 1">
+            <a:extLst>
+              <a:ext uri="{FF2B5EF4-FFF2-40B4-BE49-F238E27FC236}">
                 <a16:creationId xmlns:a16="http://schemas.microsoft.com/office/drawing/2014/main" id="{042E62ED-391C-D54C-BA95-4C1EC658F503}"/>
               </a:ext>
             </a:extLst>
@@ -11981,7 +12208,7 @@
 </p:sld>
 </file>
 
-<file path=ppt/slides/slide15.xml><?xml version="1.0" encoding="utf-8"?>
+<file path=ppt/slides/slide16.xml><?xml version="1.0" encoding="utf-8"?>
 <p:sld xmlns:a="http://schemas.openxmlformats.org/drawingml/2006/main" xmlns:r="http://schemas.openxmlformats.org/officeDocument/2006/relationships" xmlns:p="http://schemas.openxmlformats.org/presentationml/2006/main" show="0">
   <p:cSld>
     <p:spTree>
@@ -12064,7 +12291,7 @@
 </p:sld>
 </file>
 
-<file path=ppt/slides/slide16.xml><?xml version="1.0" encoding="utf-8"?>
+<file path=ppt/slides/slide17.xml><?xml version="1.0" encoding="utf-8"?>
 <p:sld xmlns:a="http://schemas.openxmlformats.org/drawingml/2006/main" xmlns:r="http://schemas.openxmlformats.org/officeDocument/2006/relationships" xmlns:p="http://schemas.openxmlformats.org/presentationml/2006/main">
   <p:cSld>
     <p:spTree>
@@ -12459,7 +12686,7 @@
 </p:sld>
 </file>
 
-<file path=ppt/slides/slide17.xml><?xml version="1.0" encoding="utf-8"?>
+<file path=ppt/slides/slide18.xml><?xml version="1.0" encoding="utf-8"?>
 <p:sld xmlns:a="http://schemas.openxmlformats.org/drawingml/2006/main" xmlns:r="http://schemas.openxmlformats.org/officeDocument/2006/relationships" xmlns:p="http://schemas.openxmlformats.org/presentationml/2006/main">
   <p:cSld>
     <p:spTree>
@@ -13380,7 +13607,7 @@
 </p:sld>
 </file>
 
-<file path=ppt/slides/slide18.xml><?xml version="1.0" encoding="utf-8"?>
+<file path=ppt/slides/slide19.xml><?xml version="1.0" encoding="utf-8"?>
 <p:sld xmlns:a="http://schemas.openxmlformats.org/drawingml/2006/main" xmlns:r="http://schemas.openxmlformats.org/officeDocument/2006/relationships" xmlns:p="http://schemas.openxmlformats.org/presentationml/2006/main">
   <p:cSld>
     <p:spTree>
@@ -14303,118 +14530,6 @@
 </p:sld>
 </file>
 
-<file path=ppt/slides/slide19.xml><?xml version="1.0" encoding="utf-8"?>
-<p:sld xmlns:a="http://schemas.openxmlformats.org/drawingml/2006/main" xmlns:r="http://schemas.openxmlformats.org/officeDocument/2006/relationships" xmlns:p="http://schemas.openxmlformats.org/presentationml/2006/main">
-  <p:cSld>
-    <p:spTree>
-      <p:nvGrpSpPr>
-        <p:cNvPr id="1" name=""/>
-        <p:cNvGrpSpPr/>
-        <p:nvPr/>
-      </p:nvGrpSpPr>
-      <p:grpSpPr>
-        <a:xfrm>
-          <a:off x="0" y="0"/>
-          <a:ext cx="0" cy="0"/>
-          <a:chOff x="0" y="0"/>
-          <a:chExt cx="0" cy="0"/>
-        </a:xfrm>
-      </p:grpSpPr>
-      <p:sp>
-        <p:nvSpPr>
-          <p:cNvPr id="2" name="Title 1">
-            <a:extLst>
-              <a:ext uri="{FF2B5EF4-FFF2-40B4-BE49-F238E27FC236}">
-                <a16:creationId xmlns:a16="http://schemas.microsoft.com/office/drawing/2014/main" id="{E634157E-EEDA-2D4E-81C5-5E8DF7F346CB}"/>
-              </a:ext>
-            </a:extLst>
-          </p:cNvPr>
-          <p:cNvSpPr>
-            <a:spLocks noGrp="1"/>
-          </p:cNvSpPr>
-          <p:nvPr>
-            <p:ph type="title"/>
-          </p:nvPr>
-        </p:nvSpPr>
-        <p:spPr/>
-        <p:txBody>
-          <a:bodyPr/>
-          <a:lstStyle/>
-          <a:p>
-            <a:r>
-              <a:rPr lang="en-US" dirty="0"/>
-              <a:t>Rothman’s model of sufficient and component causes (RMSCC)</a:t>
-            </a:r>
-          </a:p>
-        </p:txBody>
-      </p:sp>
-      <p:sp>
-        <p:nvSpPr>
-          <p:cNvPr id="3" name="Content Placeholder 2">
-            <a:extLst>
-              <a:ext uri="{FF2B5EF4-FFF2-40B4-BE49-F238E27FC236}">
-                <a16:creationId xmlns:a16="http://schemas.microsoft.com/office/drawing/2014/main" id="{0198EF66-E480-BB4B-9F0A-623A422CF0A3}"/>
-              </a:ext>
-            </a:extLst>
-          </p:cNvPr>
-          <p:cNvSpPr>
-            <a:spLocks noGrp="1"/>
-          </p:cNvSpPr>
-          <p:nvPr>
-            <p:ph idx="1"/>
-          </p:nvPr>
-        </p:nvSpPr>
-        <p:spPr/>
-        <p:txBody>
-          <a:bodyPr/>
-          <a:lstStyle/>
-          <a:p>
-            <a:r>
-              <a:rPr lang="en-US" dirty="0"/>
-              <a:t>Useful for pedagogic reasons.</a:t>
-            </a:r>
-          </a:p>
-          <a:p>
-            <a:pPr lvl="1"/>
-            <a:r>
-              <a:rPr lang="en-US" dirty="0"/>
-              <a:t>Multicausality.</a:t>
-            </a:r>
-          </a:p>
-          <a:p>
-            <a:pPr lvl="1"/>
-            <a:r>
-              <a:rPr lang="en-US" dirty="0"/>
-              <a:t>Attributable fractions sum to greater than 1.</a:t>
-            </a:r>
-          </a:p>
-          <a:p>
-            <a:r>
-              <a:rPr lang="en-US" dirty="0"/>
-              <a:t>Application to actual data analysis is yet to be determined.</a:t>
-            </a:r>
-          </a:p>
-          <a:p>
-            <a:r>
-              <a:rPr lang="en-US" dirty="0"/>
-              <a:t>Limited to dichotomous exposures and outcomes.</a:t>
-            </a:r>
-          </a:p>
-        </p:txBody>
-      </p:sp>
-    </p:spTree>
-    <p:extLst>
-      <p:ext uri="{BB962C8B-B14F-4D97-AF65-F5344CB8AC3E}">
-        <p14:creationId xmlns:p14="http://schemas.microsoft.com/office/powerpoint/2010/main" val="2979705777"/>
-      </p:ext>
-    </p:extLst>
-  </p:cSld>
-  <p:clrMapOvr>
-    <a:masterClrMapping/>
-  </p:clrMapOvr>
-</p:sld>
-</file>
-
 <file path=ppt/slides/slide2.xml><?xml version="1.0" encoding="utf-8"?>
 <p:sld xmlns:a="http://schemas.openxmlformats.org/drawingml/2006/main" xmlns:r="http://schemas.openxmlformats.org/officeDocument/2006/relationships" xmlns:p="http://schemas.openxmlformats.org/presentationml/2006/main">
   <p:cSld>
@@ -14437,7 +14552,7 @@
           <p:cNvPr id="2" name="Title 1">
             <a:extLst>
               <a:ext uri="{FF2B5EF4-FFF2-40B4-BE49-F238E27FC236}">
-                <a16:creationId xmlns:a16="http://schemas.microsoft.com/office/drawing/2014/main" id="{7E7077CB-36A6-134B-B59F-F766F4741DE5}"/>
+                <a16:creationId xmlns:a16="http://schemas.microsoft.com/office/drawing/2014/main" id="{EA0EA245-5F77-BE04-A076-3CAA760DDC77}"/>
               </a:ext>
             </a:extLst>
           </p:cNvPr>
@@ -14455,7 +14570,7 @@
           <a:p>
             <a:r>
               <a:rPr lang="en-US" dirty="0"/>
-              <a:t>Uncertainty</a:t>
+              <a:t>Discussion</a:t>
             </a:r>
           </a:p>
         </p:txBody>
@@ -14465,7 +14580,7 @@
           <p:cNvPr id="3" name="Content Placeholder 2">
             <a:extLst>
               <a:ext uri="{FF2B5EF4-FFF2-40B4-BE49-F238E27FC236}">
-                <a16:creationId xmlns:a16="http://schemas.microsoft.com/office/drawing/2014/main" id="{9C32B7C0-2904-B141-B622-8858AA1354EB}"/>
+                <a16:creationId xmlns:a16="http://schemas.microsoft.com/office/drawing/2014/main" id="{DC9294FC-4B1D-3BAB-E278-6DDF1D45A598}"/>
               </a:ext>
             </a:extLst>
           </p:cNvPr>
@@ -14481,33 +14596,71 @@
           <a:bodyPr/>
           <a:lstStyle/>
           <a:p>
-            <a:pPr marL="514350" indent="-514350">
-              <a:buFont typeface="+mj-lt"/>
-              <a:buAutoNum type="arabicPeriod"/>
+            <a:pPr marL="0" indent="0">
+              <a:buNone/>
             </a:pPr>
             <a:r>
               <a:rPr lang="en-US" dirty="0"/>
-              <a:t>Few checklists</a:t>
-            </a:r>
-          </a:p>
-          <a:p>
-            <a:pPr marL="514350" indent="-514350">
-              <a:buFont typeface="+mj-lt"/>
-              <a:buAutoNum type="arabicPeriod"/>
-            </a:pPr>
-            <a:r>
-              <a:rPr lang="en-US" dirty="0"/>
-              <a:t>Statistical uncertainty</a:t>
-            </a:r>
-          </a:p>
-          <a:p>
-            <a:pPr marL="514350" indent="-514350">
-              <a:buFont typeface="+mj-lt"/>
-              <a:buAutoNum type="arabicPeriod"/>
-            </a:pPr>
-            <a:r>
-              <a:rPr lang="en-US" dirty="0"/>
-              <a:t>Causal uncertainty</a:t>
+              <a:t>“That a certain sequence has occurred and reoccurred in the past is a matter of experience to which we give expression in the concept causation… Science in no case can demonstrate an inherent necessity in a sequence, nor provide with absolute certainty that it must be repeated.” – Karl Pearson, 1892, </a:t>
+            </a:r>
+            <a:r>
+              <a:rPr lang="en-US" i="1" dirty="0"/>
+              <a:t>The Grammar of Science</a:t>
+            </a:r>
+          </a:p>
+        </p:txBody>
+      </p:sp>
+      <p:sp>
+        <p:nvSpPr>
+          <p:cNvPr id="4" name="TextBox 3">
+            <a:extLst>
+              <a:ext uri="{FF2B5EF4-FFF2-40B4-BE49-F238E27FC236}">
+                <a16:creationId xmlns:a16="http://schemas.microsoft.com/office/drawing/2014/main" id="{6E1E42DA-2E63-281D-51B2-92B81A790D9D}"/>
+              </a:ext>
+            </a:extLst>
+          </p:cNvPr>
+          <p:cNvSpPr txBox="1"/>
+          <p:nvPr/>
+        </p:nvSpPr>
+        <p:spPr>
+          <a:xfrm>
+            <a:off x="0" y="6611779"/>
+            <a:ext cx="5870518" cy="246221"/>
+          </a:xfrm>
+          <a:prstGeom prst="rect">
+            <a:avLst/>
+          </a:prstGeom>
+          <a:noFill/>
+        </p:spPr>
+        <p:txBody>
+          <a:bodyPr wrap="none" rtlCol="0">
+            <a:spAutoFit/>
+          </a:bodyPr>
+          <a:lstStyle/>
+          <a:p>
+            <a:r>
+              <a:rPr lang="en-US" sz="1000" dirty="0">
+                <a:latin typeface="Univers" panose="020B0503020202020204" pitchFamily="34" charset="0"/>
+              </a:rPr>
+              <a:t>Source: </a:t>
+            </a:r>
+            <a:r>
+              <a:rPr lang="en-US" sz="1000" dirty="0"/>
+              <a:t>Pearl J, Mackenzie D. </a:t>
+            </a:r>
+            <a:r>
+              <a:rPr lang="en-US" sz="1000" i="1" dirty="0"/>
+              <a:t>The Book of Why: The New Science of Cause and Effect</a:t>
+            </a:r>
+            <a:r>
+              <a:rPr lang="en-US" sz="1000" dirty="0"/>
+              <a:t>. Basic Books; 2018.</a:t>
+            </a:r>
+            <a:r>
+              <a:rPr lang="en-US" sz="1000" dirty="0">
+                <a:latin typeface="Univers" panose="020B0503020202020204" pitchFamily="34" charset="0"/>
+              </a:rPr>
+              <a:t> </a:t>
             </a:r>
           </a:p>
         </p:txBody>
@@ -14515,13 +14668,18 @@
     </p:spTree>
     <p:extLst>
       <p:ext uri="{BB962C8B-B14F-4D97-AF65-F5344CB8AC3E}">
-        <p14:creationId xmlns:p14="http://schemas.microsoft.com/office/powerpoint/2010/main" val="425150026"/>
+        <p14:creationId xmlns:p14="http://schemas.microsoft.com/office/powerpoint/2010/main" val="3147338565"/>
       </p:ext>
     </p:extLst>
   </p:cSld>
   <p:clrMapOvr>
     <a:masterClrMapping/>
   </p:clrMapOvr>
+  <p:extLst>
+    <p:ext uri="{6950BFC3-D8DA-4A85-94F7-54DA5524770B}">
+      <p188:commentRel xmlns:p188="http://schemas.microsoft.com/office/powerpoint/2018/8/main" r:id="rId2"/>
+    </p:ext>
+  </p:extLst>
 </p:sld>
 </file>
 
@@ -14547,7 +14705,7 @@
           <p:cNvPr id="2" name="Title 1">
             <a:extLst>
               <a:ext uri="{FF2B5EF4-FFF2-40B4-BE49-F238E27FC236}">
-                <a16:creationId xmlns:a16="http://schemas.microsoft.com/office/drawing/2014/main" id="{63958976-4DAB-B749-B7D2-DE04ADB67249}"/>
+                <a16:creationId xmlns:a16="http://schemas.microsoft.com/office/drawing/2014/main" id="{E634157E-EEDA-2D4E-81C5-5E8DF7F346CB}"/>
               </a:ext>
             </a:extLst>
           </p:cNvPr>
@@ -14565,7 +14723,7 @@
           <a:p>
             <a:r>
               <a:rPr lang="en-US" dirty="0"/>
-              <a:t>Counterfactuals</a:t>
+              <a:t>Rothman’s model of sufficient and component causes (RMSCC)</a:t>
             </a:r>
           </a:p>
         </p:txBody>
@@ -14575,7 +14733,7 @@
           <p:cNvPr id="3" name="Content Placeholder 2">
             <a:extLst>
               <a:ext uri="{FF2B5EF4-FFF2-40B4-BE49-F238E27FC236}">
-                <a16:creationId xmlns:a16="http://schemas.microsoft.com/office/drawing/2014/main" id="{65D353C0-2D21-3E45-9D62-FC88D9E93996}"/>
+                <a16:creationId xmlns:a16="http://schemas.microsoft.com/office/drawing/2014/main" id="{0198EF66-E480-BB4B-9F0A-623A422CF0A3}"/>
               </a:ext>
             </a:extLst>
           </p:cNvPr>
@@ -14593,36 +14751,41 @@
           <a:p>
             <a:r>
               <a:rPr lang="en-US" dirty="0"/>
-              <a:t>Had X been different and everything else been the same.</a:t>
-            </a:r>
-          </a:p>
-          <a:p>
+              <a:t>Useful for pedagogic reasons.</a:t>
+            </a:r>
+          </a:p>
+          <a:p>
+            <a:pPr lvl="1"/>
             <a:r>
               <a:rPr lang="en-US" dirty="0"/>
-              <a:t>Time machine explanation</a:t>
-            </a:r>
-          </a:p>
-          <a:p>
+              <a:t>Multicausality.</a:t>
+            </a:r>
+          </a:p>
+          <a:p>
+            <a:pPr lvl="1"/>
             <a:r>
               <a:rPr lang="en-US" dirty="0"/>
-              <a:t>Of course, we can’t do this… directly.</a:t>
+              <a:t>Attributable fractions sum to greater than 1.</a:t>
             </a:r>
           </a:p>
           <a:p>
             <a:r>
               <a:rPr lang="en-US" dirty="0"/>
-              <a:t>Idealized randomized experiments.</a:t>
-            </a:r>
-          </a:p>
-          <a:p>
-            <a:endParaRPr lang="en-US" dirty="0"/>
+              <a:t>Application to actual data analysis is yet to be determined.</a:t>
+            </a:r>
+          </a:p>
+          <a:p>
+            <a:r>
+              <a:rPr lang="en-US" dirty="0"/>
+              <a:t>Limited to dichotomous exposures and outcomes.</a:t>
+            </a:r>
           </a:p>
         </p:txBody>
       </p:sp>
     </p:spTree>
     <p:extLst>
       <p:ext uri="{BB962C8B-B14F-4D97-AF65-F5344CB8AC3E}">
-        <p14:creationId xmlns:p14="http://schemas.microsoft.com/office/powerpoint/2010/main" val="1642462221"/>
+        <p14:creationId xmlns:p14="http://schemas.microsoft.com/office/powerpoint/2010/main" val="2979705777"/>
       </p:ext>
     </p:extLst>
   </p:cSld>
@@ -14672,7 +14835,7 @@
           <a:p>
             <a:r>
               <a:rPr lang="en-US" dirty="0"/>
-              <a:t>“Idealized” random experiments</a:t>
+              <a:t>Counterfactuals</a:t>
             </a:r>
           </a:p>
         </p:txBody>
@@ -14700,56 +14863,36 @@
           <a:p>
             <a:r>
               <a:rPr lang="en-US" dirty="0"/>
-              <a:t>When Feasible and ethically possible.</a:t>
-            </a:r>
-          </a:p>
-          <a:p>
-            <a:pPr lvl="1"/>
+              <a:t>Had X been different and everything else been the same.</a:t>
+            </a:r>
+          </a:p>
+          <a:p>
             <a:r>
               <a:rPr lang="en-US" dirty="0"/>
-              <a:t>No loss to follow-up.</a:t>
-            </a:r>
-          </a:p>
-          <a:p>
-            <a:pPr lvl="1"/>
+              <a:t>Time machine explanation</a:t>
+            </a:r>
+          </a:p>
+          <a:p>
             <a:r>
               <a:rPr lang="en-US" dirty="0"/>
-              <a:t>Full adherence to the assigned exposure/treatment.</a:t>
-            </a:r>
-          </a:p>
-          <a:p>
-            <a:pPr lvl="1"/>
+              <a:t>Of course, we can’t do this… directly.</a:t>
+            </a:r>
+          </a:p>
+          <a:p>
             <a:r>
               <a:rPr lang="en-US" dirty="0"/>
-              <a:t>Double blind assignment.</a:t>
-            </a:r>
-          </a:p>
-          <a:p>
-            <a:pPr lvl="1"/>
-            <a:r>
-              <a:rPr lang="en-US" dirty="0"/>
-              <a:t>Reasonably “natural” conditions.</a:t>
-            </a:r>
-          </a:p>
-          <a:p>
-            <a:pPr lvl="1"/>
-            <a:r>
-              <a:rPr lang="en-US" dirty="0"/>
-              <a:t>Large enough sample to rule out random error.</a:t>
-            </a:r>
-          </a:p>
-          <a:p>
-            <a:r>
-              <a:rPr lang="en-US" dirty="0"/>
-              <a:t>Effect of exposure/treatment on outcome can be interpreted as the average causal effect.</a:t>
-            </a:r>
+              <a:t>Idealized randomized experiments.</a:t>
+            </a:r>
+          </a:p>
+          <a:p>
+            <a:endParaRPr lang="en-US" dirty="0"/>
           </a:p>
         </p:txBody>
       </p:sp>
     </p:spTree>
     <p:extLst>
       <p:ext uri="{BB962C8B-B14F-4D97-AF65-F5344CB8AC3E}">
-        <p14:creationId xmlns:p14="http://schemas.microsoft.com/office/powerpoint/2010/main" val="2646596856"/>
+        <p14:creationId xmlns:p14="http://schemas.microsoft.com/office/powerpoint/2010/main" val="1642462221"/>
       </p:ext>
     </p:extLst>
   </p:cSld>
@@ -14781,6 +14924,133 @@
           <p:cNvPr id="2" name="Title 1">
             <a:extLst>
               <a:ext uri="{FF2B5EF4-FFF2-40B4-BE49-F238E27FC236}">
+                <a16:creationId xmlns:a16="http://schemas.microsoft.com/office/drawing/2014/main" id="{63958976-4DAB-B749-B7D2-DE04ADB67249}"/>
+              </a:ext>
+            </a:extLst>
+          </p:cNvPr>
+          <p:cNvSpPr>
+            <a:spLocks noGrp="1"/>
+          </p:cNvSpPr>
+          <p:nvPr>
+            <p:ph type="title"/>
+          </p:nvPr>
+        </p:nvSpPr>
+        <p:spPr/>
+        <p:txBody>
+          <a:bodyPr/>
+          <a:lstStyle/>
+          <a:p>
+            <a:r>
+              <a:rPr lang="en-US" dirty="0"/>
+              <a:t>“Idealized” random experiments</a:t>
+            </a:r>
+          </a:p>
+        </p:txBody>
+      </p:sp>
+      <p:sp>
+        <p:nvSpPr>
+          <p:cNvPr id="3" name="Content Placeholder 2">
+            <a:extLst>
+              <a:ext uri="{FF2B5EF4-FFF2-40B4-BE49-F238E27FC236}">
+                <a16:creationId xmlns:a16="http://schemas.microsoft.com/office/drawing/2014/main" id="{65D353C0-2D21-3E45-9D62-FC88D9E93996}"/>
+              </a:ext>
+            </a:extLst>
+          </p:cNvPr>
+          <p:cNvSpPr>
+            <a:spLocks noGrp="1"/>
+          </p:cNvSpPr>
+          <p:nvPr>
+            <p:ph idx="1"/>
+          </p:nvPr>
+        </p:nvSpPr>
+        <p:spPr/>
+        <p:txBody>
+          <a:bodyPr/>
+          <a:lstStyle/>
+          <a:p>
+            <a:r>
+              <a:rPr lang="en-US" dirty="0"/>
+              <a:t>When Feasible and ethically possible.</a:t>
+            </a:r>
+          </a:p>
+          <a:p>
+            <a:pPr lvl="1"/>
+            <a:r>
+              <a:rPr lang="en-US" dirty="0"/>
+              <a:t>No loss to follow-up.</a:t>
+            </a:r>
+          </a:p>
+          <a:p>
+            <a:pPr lvl="1"/>
+            <a:r>
+              <a:rPr lang="en-US" dirty="0"/>
+              <a:t>Full adherence to the assigned exposure/treatment.</a:t>
+            </a:r>
+          </a:p>
+          <a:p>
+            <a:pPr lvl="1"/>
+            <a:r>
+              <a:rPr lang="en-US" dirty="0"/>
+              <a:t>Double blind assignment.</a:t>
+            </a:r>
+          </a:p>
+          <a:p>
+            <a:pPr lvl="1"/>
+            <a:r>
+              <a:rPr lang="en-US" dirty="0"/>
+              <a:t>Reasonably “natural” conditions.</a:t>
+            </a:r>
+          </a:p>
+          <a:p>
+            <a:pPr lvl="1"/>
+            <a:r>
+              <a:rPr lang="en-US" dirty="0"/>
+              <a:t>Large enough sample to rule out random error.</a:t>
+            </a:r>
+          </a:p>
+          <a:p>
+            <a:r>
+              <a:rPr lang="en-US" dirty="0"/>
+              <a:t>Effect of exposure/treatment on outcome can be interpreted as the average causal effect.</a:t>
+            </a:r>
+          </a:p>
+        </p:txBody>
+      </p:sp>
+    </p:spTree>
+    <p:extLst>
+      <p:ext uri="{BB962C8B-B14F-4D97-AF65-F5344CB8AC3E}">
+        <p14:creationId xmlns:p14="http://schemas.microsoft.com/office/powerpoint/2010/main" val="2646596856"/>
+      </p:ext>
+    </p:extLst>
+  </p:cSld>
+  <p:clrMapOvr>
+    <a:masterClrMapping/>
+  </p:clrMapOvr>
+</p:sld>
+</file>
+
+<file path=ppt/slides/slide23.xml><?xml version="1.0" encoding="utf-8"?>
+<p:sld xmlns:a="http://schemas.openxmlformats.org/drawingml/2006/main" xmlns:r="http://schemas.openxmlformats.org/officeDocument/2006/relationships" xmlns:p="http://schemas.openxmlformats.org/presentationml/2006/main">
+  <p:cSld>
+    <p:spTree>
+      <p:nvGrpSpPr>
+        <p:cNvPr id="1" name=""/>
+        <p:cNvGrpSpPr/>
+        <p:nvPr/>
+      </p:nvGrpSpPr>
+      <p:grpSpPr>
+        <a:xfrm>
+          <a:off x="0" y="0"/>
+          <a:ext cx="0" cy="0"/>
+          <a:chOff x="0" y="0"/>
+          <a:chExt cx="0" cy="0"/>
+        </a:xfrm>
+      </p:grpSpPr>
+      <p:sp>
+        <p:nvSpPr>
+          <p:cNvPr id="2" name="Title 1">
+            <a:extLst>
+              <a:ext uri="{FF2B5EF4-FFF2-40B4-BE49-F238E27FC236}">
                 <a16:creationId xmlns:a16="http://schemas.microsoft.com/office/drawing/2014/main" id="{D3DEF3FC-0BB8-5846-81F6-B5A18671E554}"/>
               </a:ext>
             </a:extLst>
@@ -14886,7 +15156,7 @@
 </p:sld>
 </file>
 
-<file path=ppt/slides/slide23.xml><?xml version="1.0" encoding="utf-8"?>
+<file path=ppt/slides/slide24.xml><?xml version="1.0" encoding="utf-8"?>
 <p:sld xmlns:a="http://schemas.openxmlformats.org/drawingml/2006/main" xmlns:r="http://schemas.openxmlformats.org/officeDocument/2006/relationships" xmlns:p="http://schemas.openxmlformats.org/presentationml/2006/main">
   <p:cSld>
     <p:spTree>
@@ -15193,7 +15463,7 @@
 </p:sld>
 </file>
 
-<file path=ppt/slides/slide24.xml><?xml version="1.0" encoding="utf-8"?>
+<file path=ppt/slides/slide25.xml><?xml version="1.0" encoding="utf-8"?>
 <p:sld xmlns:a="http://schemas.openxmlformats.org/drawingml/2006/main" xmlns:r="http://schemas.openxmlformats.org/officeDocument/2006/relationships" xmlns:p="http://schemas.openxmlformats.org/presentationml/2006/main">
   <p:cSld>
     <p:spTree>
@@ -15549,7 +15819,7 @@
 </p:sld>
 </file>
 
-<file path=ppt/slides/slide25.xml><?xml version="1.0" encoding="utf-8"?>
+<file path=ppt/slides/slide26.xml><?xml version="1.0" encoding="utf-8"?>
 <p:sld xmlns:a="http://schemas.openxmlformats.org/drawingml/2006/main" xmlns:r="http://schemas.openxmlformats.org/officeDocument/2006/relationships" xmlns:p="http://schemas.openxmlformats.org/presentationml/2006/main">
   <p:cSld>
     <p:spTree>
@@ -16144,7 +16414,7 @@
 </p:sld>
 </file>
 
-<file path=ppt/slides/slide26.xml><?xml version="1.0" encoding="utf-8"?>
+<file path=ppt/slides/slide27.xml><?xml version="1.0" encoding="utf-8"?>
 <p:sld xmlns:a="http://schemas.openxmlformats.org/drawingml/2006/main" xmlns:r="http://schemas.openxmlformats.org/officeDocument/2006/relationships" xmlns:p="http://schemas.openxmlformats.org/presentationml/2006/main">
   <p:cSld>
     <p:spTree>
@@ -16618,7 +16888,7 @@
 </p:sld>
 </file>
 
-<file path=ppt/slides/slide27.xml><?xml version="1.0" encoding="utf-8"?>
+<file path=ppt/slides/slide28.xml><?xml version="1.0" encoding="utf-8"?>
 <p:sld xmlns:a="http://schemas.openxmlformats.org/drawingml/2006/main" xmlns:r="http://schemas.openxmlformats.org/officeDocument/2006/relationships" xmlns:p="http://schemas.openxmlformats.org/presentationml/2006/main">
   <p:cSld>
     <p:spTree>
@@ -16876,7 +17146,7 @@
 </p:sld>
 </file>
 
-<file path=ppt/slides/slide28.xml><?xml version="1.0" encoding="utf-8"?>
+<file path=ppt/slides/slide29.xml><?xml version="1.0" encoding="utf-8"?>
 <p:sld xmlns:a="http://schemas.openxmlformats.org/drawingml/2006/main" xmlns:r="http://schemas.openxmlformats.org/officeDocument/2006/relationships" xmlns:p="http://schemas.openxmlformats.org/presentationml/2006/main">
   <p:cSld>
     <p:spTree>
@@ -17217,7 +17487,117 @@
 </p:sld>
 </file>
 
-<file path=ppt/slides/slide29.xml><?xml version="1.0" encoding="utf-8"?>
+<file path=ppt/slides/slide3.xml><?xml version="1.0" encoding="utf-8"?>
+<p:sld xmlns:a="http://schemas.openxmlformats.org/drawingml/2006/main" xmlns:r="http://schemas.openxmlformats.org/officeDocument/2006/relationships" xmlns:p="http://schemas.openxmlformats.org/presentationml/2006/main">
+  <p:cSld>
+    <p:spTree>
+      <p:nvGrpSpPr>
+        <p:cNvPr id="1" name=""/>
+        <p:cNvGrpSpPr/>
+        <p:nvPr/>
+      </p:nvGrpSpPr>
+      <p:grpSpPr>
+        <a:xfrm>
+          <a:off x="0" y="0"/>
+          <a:ext cx="0" cy="0"/>
+          <a:chOff x="0" y="0"/>
+          <a:chExt cx="0" cy="0"/>
+        </a:xfrm>
+      </p:grpSpPr>
+      <p:sp>
+        <p:nvSpPr>
+          <p:cNvPr id="2" name="Title 1">
+            <a:extLst>
+              <a:ext uri="{FF2B5EF4-FFF2-40B4-BE49-F238E27FC236}">
+                <a16:creationId xmlns:a16="http://schemas.microsoft.com/office/drawing/2014/main" id="{7E7077CB-36A6-134B-B59F-F766F4741DE5}"/>
+              </a:ext>
+            </a:extLst>
+          </p:cNvPr>
+          <p:cNvSpPr>
+            <a:spLocks noGrp="1"/>
+          </p:cNvSpPr>
+          <p:nvPr>
+            <p:ph type="title"/>
+          </p:nvPr>
+        </p:nvSpPr>
+        <p:spPr/>
+        <p:txBody>
+          <a:bodyPr/>
+          <a:lstStyle/>
+          <a:p>
+            <a:r>
+              <a:rPr lang="en-US" dirty="0"/>
+              <a:t>Uncertainty</a:t>
+            </a:r>
+          </a:p>
+        </p:txBody>
+      </p:sp>
+      <p:sp>
+        <p:nvSpPr>
+          <p:cNvPr id="3" name="Content Placeholder 2">
+            <a:extLst>
+              <a:ext uri="{FF2B5EF4-FFF2-40B4-BE49-F238E27FC236}">
+                <a16:creationId xmlns:a16="http://schemas.microsoft.com/office/drawing/2014/main" id="{9C32B7C0-2904-B141-B622-8858AA1354EB}"/>
+              </a:ext>
+            </a:extLst>
+          </p:cNvPr>
+          <p:cNvSpPr>
+            <a:spLocks noGrp="1"/>
+          </p:cNvSpPr>
+          <p:nvPr>
+            <p:ph idx="1"/>
+          </p:nvPr>
+        </p:nvSpPr>
+        <p:spPr/>
+        <p:txBody>
+          <a:bodyPr/>
+          <a:lstStyle/>
+          <a:p>
+            <a:pPr marL="514350" indent="-514350">
+              <a:buFont typeface="+mj-lt"/>
+              <a:buAutoNum type="arabicPeriod"/>
+            </a:pPr>
+            <a:r>
+              <a:rPr lang="en-US" dirty="0"/>
+              <a:t>Few checklists</a:t>
+            </a:r>
+          </a:p>
+          <a:p>
+            <a:pPr marL="514350" indent="-514350">
+              <a:buFont typeface="+mj-lt"/>
+              <a:buAutoNum type="arabicPeriod"/>
+            </a:pPr>
+            <a:r>
+              <a:rPr lang="en-US" dirty="0"/>
+              <a:t>Statistical uncertainty</a:t>
+            </a:r>
+          </a:p>
+          <a:p>
+            <a:pPr marL="514350" indent="-514350">
+              <a:buFont typeface="+mj-lt"/>
+              <a:buAutoNum type="arabicPeriod"/>
+            </a:pPr>
+            <a:r>
+              <a:rPr lang="en-US" dirty="0"/>
+              <a:t>Causal uncertainty</a:t>
+            </a:r>
+          </a:p>
+        </p:txBody>
+      </p:sp>
+    </p:spTree>
+    <p:extLst>
+      <p:ext uri="{BB962C8B-B14F-4D97-AF65-F5344CB8AC3E}">
+        <p14:creationId xmlns:p14="http://schemas.microsoft.com/office/powerpoint/2010/main" val="425150026"/>
+      </p:ext>
+    </p:extLst>
+  </p:cSld>
+  <p:clrMapOvr>
+    <a:masterClrMapping/>
+  </p:clrMapOvr>
+</p:sld>
+</file>
+
+<file path=ppt/slides/slide30.xml><?xml version="1.0" encoding="utf-8"?>
 <p:sld xmlns:a="http://schemas.openxmlformats.org/drawingml/2006/main" xmlns:r="http://schemas.openxmlformats.org/officeDocument/2006/relationships" xmlns:p="http://schemas.openxmlformats.org/presentationml/2006/main">
   <p:cSld>
     <p:spTree>
@@ -17477,59 +17857,7 @@
 </p:sld>
 </file>
 
-<file path=ppt/slides/slide3.xml><?xml version="1.0" encoding="utf-8"?>
-<p:sld xmlns:a="http://schemas.openxmlformats.org/drawingml/2006/main" xmlns:r="http://schemas.openxmlformats.org/officeDocument/2006/relationships" xmlns:p="http://schemas.openxmlformats.org/presentationml/2006/main">
-  <p:cSld>
-    <p:spTree>
-      <p:nvGrpSpPr>
-        <p:cNvPr id="1" name=""/>
-        <p:cNvGrpSpPr/>
-        <p:nvPr/>
-      </p:nvGrpSpPr>
-      <p:grpSpPr>
-        <a:xfrm>
-          <a:off x="0" y="0"/>
-          <a:ext cx="0" cy="0"/>
-          <a:chOff x="0" y="0"/>
-          <a:chExt cx="0" cy="0"/>
-        </a:xfrm>
-      </p:grpSpPr>
-      <p:graphicFrame>
-        <p:nvGraphicFramePr>
-          <p:cNvPr id="5" name="Diagram 4">
-            <a:extLst>
-              <a:ext uri="{FF2B5EF4-FFF2-40B4-BE49-F238E27FC236}">
-                <a16:creationId xmlns:a16="http://schemas.microsoft.com/office/drawing/2014/main" id="{D709FF4F-E8DD-9A4C-AA4A-F6BBA6A070CE}"/>
-              </a:ext>
-            </a:extLst>
-          </p:cNvPr>
-          <p:cNvGraphicFramePr/>
-          <p:nvPr/>
-        </p:nvGraphicFramePr>
-        <p:xfrm>
-          <a:off x="890385" y="0"/>
-          <a:ext cx="10411230" cy="6841375"/>
-        </p:xfrm>
-        <a:graphic>
-          <a:graphicData uri="http://schemas.openxmlformats.org/drawingml/2006/diagram">
-            <dgm:relIds xmlns:dgm="http://schemas.openxmlformats.org/drawingml/2006/diagram" xmlns:r="http://schemas.openxmlformats.org/officeDocument/2006/relationships" r:dm="rId3" r:lo="rId4" r:qs="rId5" r:cs="rId6"/>
-          </a:graphicData>
-        </a:graphic>
-      </p:graphicFrame>
-    </p:spTree>
-    <p:extLst>
-      <p:ext uri="{BB962C8B-B14F-4D97-AF65-F5344CB8AC3E}">
-        <p14:creationId xmlns:p14="http://schemas.microsoft.com/office/powerpoint/2010/main" val="3768086851"/>
-      </p:ext>
-    </p:extLst>
-  </p:cSld>
-  <p:clrMapOvr>
-    <a:masterClrMapping/>
-  </p:clrMapOvr>
-</p:sld>
-</file>
-
-<file path=ppt/slides/slide30.xml><?xml version="1.0" encoding="utf-8"?>
+<file path=ppt/slides/slide31.xml><?xml version="1.0" encoding="utf-8"?>
 <p:sld xmlns:a="http://schemas.openxmlformats.org/drawingml/2006/main" xmlns:r="http://schemas.openxmlformats.org/officeDocument/2006/relationships" xmlns:p="http://schemas.openxmlformats.org/presentationml/2006/main">
   <p:cSld>
     <p:spTree>
@@ -17789,7 +18117,7 @@
 </p:sld>
 </file>
 
-<file path=ppt/slides/slide31.xml><?xml version="1.0" encoding="utf-8"?>
+<file path=ppt/slides/slide32.xml><?xml version="1.0" encoding="utf-8"?>
 <p:sld xmlns:a="http://schemas.openxmlformats.org/drawingml/2006/main" xmlns:r="http://schemas.openxmlformats.org/officeDocument/2006/relationships" xmlns:p="http://schemas.openxmlformats.org/presentationml/2006/main">
   <p:cSld>
     <p:spTree>
@@ -17921,7 +18249,7 @@
 </p:sld>
 </file>
 
-<file path=ppt/slides/slide32.xml><?xml version="1.0" encoding="utf-8"?>
+<file path=ppt/slides/slide33.xml><?xml version="1.0" encoding="utf-8"?>
 <p:sld xmlns:a="http://schemas.openxmlformats.org/drawingml/2006/main" xmlns:r="http://schemas.openxmlformats.org/officeDocument/2006/relationships" xmlns:p="http://schemas.openxmlformats.org/presentationml/2006/main">
   <p:cSld>
     <p:spTree>
@@ -18413,7 +18741,7 @@
 </p:sld>
 </file>
 
-<file path=ppt/slides/slide33.xml><?xml version="1.0" encoding="utf-8"?>
+<file path=ppt/slides/slide34.xml><?xml version="1.0" encoding="utf-8"?>
 <p:sld xmlns:a="http://schemas.openxmlformats.org/drawingml/2006/main" xmlns:r="http://schemas.openxmlformats.org/officeDocument/2006/relationships" xmlns:p="http://schemas.openxmlformats.org/presentationml/2006/main">
   <p:cSld>
     <p:spTree>
@@ -18911,7 +19239,7 @@
 </p:sld>
 </file>
 
-<file path=ppt/slides/slide34.xml><?xml version="1.0" encoding="utf-8"?>
+<file path=ppt/slides/slide35.xml><?xml version="1.0" encoding="utf-8"?>
 <p:sld xmlns:a="http://schemas.openxmlformats.org/drawingml/2006/main" xmlns:r="http://schemas.openxmlformats.org/officeDocument/2006/relationships" xmlns:p="http://schemas.openxmlformats.org/presentationml/2006/main">
   <p:cSld>
     <p:spTree>
@@ -19409,7 +19737,7 @@
 </p:sld>
 </file>
 
-<file path=ppt/slides/slide35.xml><?xml version="1.0" encoding="utf-8"?>
+<file path=ppt/slides/slide36.xml><?xml version="1.0" encoding="utf-8"?>
 <p:sld xmlns:a="http://schemas.openxmlformats.org/drawingml/2006/main" xmlns:r="http://schemas.openxmlformats.org/officeDocument/2006/relationships" xmlns:p="http://schemas.openxmlformats.org/presentationml/2006/main">
   <p:cSld>
     <p:spTree>
@@ -19788,138 +20116,6 @@
 </p:sld>
 </file>
 
-<file path=ppt/slides/slide36.xml><?xml version="1.0" encoding="utf-8"?>
-<p:sld xmlns:a="http://schemas.openxmlformats.org/drawingml/2006/main" xmlns:r="http://schemas.openxmlformats.org/officeDocument/2006/relationships" xmlns:p="http://schemas.openxmlformats.org/presentationml/2006/main">
-  <p:cSld>
-    <p:spTree>
-      <p:nvGrpSpPr>
-        <p:cNvPr id="1" name=""/>
-        <p:cNvGrpSpPr/>
-        <p:nvPr/>
-      </p:nvGrpSpPr>
-      <p:grpSpPr>
-        <a:xfrm>
-          <a:off x="0" y="0"/>
-          <a:ext cx="0" cy="0"/>
-          <a:chOff x="0" y="0"/>
-          <a:chExt cx="0" cy="0"/>
-        </a:xfrm>
-      </p:grpSpPr>
-      <p:sp>
-        <p:nvSpPr>
-          <p:cNvPr id="2" name="Title 1">
-            <a:extLst>
-              <a:ext uri="{FF2B5EF4-FFF2-40B4-BE49-F238E27FC236}">
-                <a16:creationId xmlns:a16="http://schemas.microsoft.com/office/drawing/2014/main" id="{8A22FD68-B1E1-D049-B4A0-9302A83E2646}"/>
-              </a:ext>
-            </a:extLst>
-          </p:cNvPr>
-          <p:cNvSpPr>
-            <a:spLocks noGrp="1"/>
-          </p:cNvSpPr>
-          <p:nvPr>
-            <p:ph type="title"/>
-          </p:nvPr>
-        </p:nvSpPr>
-        <p:spPr/>
-        <p:txBody>
-          <a:bodyPr/>
-          <a:lstStyle/>
-          <a:p>
-            <a:r>
-              <a:rPr lang="en-US" dirty="0"/>
-              <a:t>D-separation Rules</a:t>
-            </a:r>
-          </a:p>
-        </p:txBody>
-      </p:sp>
-      <p:sp>
-        <p:nvSpPr>
-          <p:cNvPr id="3" name="Content Placeholder 2">
-            <a:extLst>
-              <a:ext uri="{FF2B5EF4-FFF2-40B4-BE49-F238E27FC236}">
-                <a16:creationId xmlns:a16="http://schemas.microsoft.com/office/drawing/2014/main" id="{95926409-67C1-7848-99E7-1C2B1C4CC68E}"/>
-              </a:ext>
-            </a:extLst>
-          </p:cNvPr>
-          <p:cNvSpPr>
-            <a:spLocks noGrp="1"/>
-          </p:cNvSpPr>
-          <p:nvPr>
-            <p:ph idx="1"/>
-          </p:nvPr>
-        </p:nvSpPr>
-        <p:spPr/>
-        <p:txBody>
-          <a:bodyPr>
-            <a:normAutofit lnSpcReduction="10000"/>
-          </a:bodyPr>
-          <a:lstStyle/>
-          <a:p>
-            <a:pPr marL="514350" indent="-514350">
-              <a:buFont typeface="+mj-lt"/>
-              <a:buAutoNum type="arabicPeriod"/>
-            </a:pPr>
-            <a:r>
-              <a:rPr lang="en-US" dirty="0"/>
-              <a:t>If there are no variables being conditioned on, a path is blocked if and only if two arrowheads on the path collide at some variable on the path.</a:t>
-            </a:r>
-          </a:p>
-          <a:p>
-            <a:pPr marL="514350" indent="-514350">
-              <a:buFont typeface="+mj-lt"/>
-              <a:buAutoNum type="arabicPeriod"/>
-            </a:pPr>
-            <a:r>
-              <a:rPr lang="en-US" dirty="0"/>
-              <a:t>Any path that contains a non-collider that has been conditioned on is blocked.</a:t>
-            </a:r>
-          </a:p>
-          <a:p>
-            <a:pPr marL="514350" indent="-514350">
-              <a:buFont typeface="+mj-lt"/>
-              <a:buAutoNum type="arabicPeriod"/>
-            </a:pPr>
-            <a:r>
-              <a:rPr lang="en-US" dirty="0"/>
-              <a:t>A collider that has been conditioned on does not block a path. </a:t>
-            </a:r>
-          </a:p>
-          <a:p>
-            <a:pPr marL="514350" indent="-514350">
-              <a:buFont typeface="+mj-lt"/>
-              <a:buAutoNum type="arabicPeriod"/>
-            </a:pPr>
-            <a:r>
-              <a:rPr lang="en-US" dirty="0"/>
-              <a:t>A collider that has a descendant that has been conditioned on does not block a path.</a:t>
-            </a:r>
-          </a:p>
-          <a:p>
-            <a:pPr marL="514350" indent="-514350">
-              <a:buFont typeface="+mj-lt"/>
-              <a:buAutoNum type="arabicPeriod"/>
-            </a:pPr>
-            <a:r>
-              <a:rPr lang="en-US" dirty="0"/>
-              <a:t>Two variables are D-separated if all paths between them are blocked.</a:t>
-            </a:r>
-          </a:p>
-        </p:txBody>
-      </p:sp>
-    </p:spTree>
-    <p:extLst>
-      <p:ext uri="{BB962C8B-B14F-4D97-AF65-F5344CB8AC3E}">
-        <p14:creationId xmlns:p14="http://schemas.microsoft.com/office/powerpoint/2010/main" val="2355142556"/>
-      </p:ext>
-    </p:extLst>
-  </p:cSld>
-  <p:clrMapOvr>
-    <a:masterClrMapping/>
-  </p:clrMapOvr>
-</p:sld>
-</file>
-
 <file path=ppt/slides/slide37.xml><?xml version="1.0" encoding="utf-8"?>
 <p:sld xmlns:a="http://schemas.openxmlformats.org/drawingml/2006/main" xmlns:r="http://schemas.openxmlformats.org/officeDocument/2006/relationships" xmlns:p="http://schemas.openxmlformats.org/presentationml/2006/main">
   <p:cSld>
@@ -19942,6 +20138,138 @@
           <p:cNvPr id="2" name="Title 1">
             <a:extLst>
               <a:ext uri="{FF2B5EF4-FFF2-40B4-BE49-F238E27FC236}">
+                <a16:creationId xmlns:a16="http://schemas.microsoft.com/office/drawing/2014/main" id="{8A22FD68-B1E1-D049-B4A0-9302A83E2646}"/>
+              </a:ext>
+            </a:extLst>
+          </p:cNvPr>
+          <p:cNvSpPr>
+            <a:spLocks noGrp="1"/>
+          </p:cNvSpPr>
+          <p:nvPr>
+            <p:ph type="title"/>
+          </p:nvPr>
+        </p:nvSpPr>
+        <p:spPr/>
+        <p:txBody>
+          <a:bodyPr/>
+          <a:lstStyle/>
+          <a:p>
+            <a:r>
+              <a:rPr lang="en-US" dirty="0"/>
+              <a:t>D-separation Rules</a:t>
+            </a:r>
+          </a:p>
+        </p:txBody>
+      </p:sp>
+      <p:sp>
+        <p:nvSpPr>
+          <p:cNvPr id="3" name="Content Placeholder 2">
+            <a:extLst>
+              <a:ext uri="{FF2B5EF4-FFF2-40B4-BE49-F238E27FC236}">
+                <a16:creationId xmlns:a16="http://schemas.microsoft.com/office/drawing/2014/main" id="{95926409-67C1-7848-99E7-1C2B1C4CC68E}"/>
+              </a:ext>
+            </a:extLst>
+          </p:cNvPr>
+          <p:cNvSpPr>
+            <a:spLocks noGrp="1"/>
+          </p:cNvSpPr>
+          <p:nvPr>
+            <p:ph idx="1"/>
+          </p:nvPr>
+        </p:nvSpPr>
+        <p:spPr/>
+        <p:txBody>
+          <a:bodyPr>
+            <a:normAutofit lnSpcReduction="10000"/>
+          </a:bodyPr>
+          <a:lstStyle/>
+          <a:p>
+            <a:pPr marL="514350" indent="-514350">
+              <a:buFont typeface="+mj-lt"/>
+              <a:buAutoNum type="arabicPeriod"/>
+            </a:pPr>
+            <a:r>
+              <a:rPr lang="en-US" dirty="0"/>
+              <a:t>If there are no variables being conditioned on, a path is blocked if and only if two arrowheads on the path collide at some variable on the path.</a:t>
+            </a:r>
+          </a:p>
+          <a:p>
+            <a:pPr marL="514350" indent="-514350">
+              <a:buFont typeface="+mj-lt"/>
+              <a:buAutoNum type="arabicPeriod"/>
+            </a:pPr>
+            <a:r>
+              <a:rPr lang="en-US" dirty="0"/>
+              <a:t>Any path that contains a non-collider that has been conditioned on is blocked.</a:t>
+            </a:r>
+          </a:p>
+          <a:p>
+            <a:pPr marL="514350" indent="-514350">
+              <a:buFont typeface="+mj-lt"/>
+              <a:buAutoNum type="arabicPeriod"/>
+            </a:pPr>
+            <a:r>
+              <a:rPr lang="en-US" dirty="0"/>
+              <a:t>A collider that has been conditioned on does not block a path. </a:t>
+            </a:r>
+          </a:p>
+          <a:p>
+            <a:pPr marL="514350" indent="-514350">
+              <a:buFont typeface="+mj-lt"/>
+              <a:buAutoNum type="arabicPeriod"/>
+            </a:pPr>
+            <a:r>
+              <a:rPr lang="en-US" dirty="0"/>
+              <a:t>A collider that has a descendant that has been conditioned on does not block a path.</a:t>
+            </a:r>
+          </a:p>
+          <a:p>
+            <a:pPr marL="514350" indent="-514350">
+              <a:buFont typeface="+mj-lt"/>
+              <a:buAutoNum type="arabicPeriod"/>
+            </a:pPr>
+            <a:r>
+              <a:rPr lang="en-US" dirty="0"/>
+              <a:t>Two variables are D-separated if all paths between them are blocked.</a:t>
+            </a:r>
+          </a:p>
+        </p:txBody>
+      </p:sp>
+    </p:spTree>
+    <p:extLst>
+      <p:ext uri="{BB962C8B-B14F-4D97-AF65-F5344CB8AC3E}">
+        <p14:creationId xmlns:p14="http://schemas.microsoft.com/office/powerpoint/2010/main" val="2355142556"/>
+      </p:ext>
+    </p:extLst>
+  </p:cSld>
+  <p:clrMapOvr>
+    <a:masterClrMapping/>
+  </p:clrMapOvr>
+</p:sld>
+</file>
+
+<file path=ppt/slides/slide38.xml><?xml version="1.0" encoding="utf-8"?>
+<p:sld xmlns:a="http://schemas.openxmlformats.org/drawingml/2006/main" xmlns:r="http://schemas.openxmlformats.org/officeDocument/2006/relationships" xmlns:p="http://schemas.openxmlformats.org/presentationml/2006/main">
+  <p:cSld>
+    <p:spTree>
+      <p:nvGrpSpPr>
+        <p:cNvPr id="1" name=""/>
+        <p:cNvGrpSpPr/>
+        <p:nvPr/>
+      </p:nvGrpSpPr>
+      <p:grpSpPr>
+        <a:xfrm>
+          <a:off x="0" y="0"/>
+          <a:ext cx="0" cy="0"/>
+          <a:chOff x="0" y="0"/>
+          <a:chExt cx="0" cy="0"/>
+        </a:xfrm>
+      </p:grpSpPr>
+      <p:sp>
+        <p:nvSpPr>
+          <p:cNvPr id="2" name="Title 1">
+            <a:extLst>
+              <a:ext uri="{FF2B5EF4-FFF2-40B4-BE49-F238E27FC236}">
                 <a16:creationId xmlns:a16="http://schemas.microsoft.com/office/drawing/2014/main" id="{CB75CEE5-C60C-254A-BC1F-BCA3518782DB}"/>
               </a:ext>
             </a:extLst>
@@ -20071,7 +20399,7 @@
 </p:sld>
 </file>
 
-<file path=ppt/slides/slide38.xml><?xml version="1.0" encoding="utf-8"?>
+<file path=ppt/slides/slide39.xml><?xml version="1.0" encoding="utf-8"?>
 <p:sld xmlns:a="http://schemas.openxmlformats.org/drawingml/2006/main" xmlns:r="http://schemas.openxmlformats.org/officeDocument/2006/relationships" xmlns:p="http://schemas.openxmlformats.org/presentationml/2006/main" show="0">
   <p:cSld>
     <p:spTree>
@@ -20502,7 +20830,59 @@
 </p:sld>
 </file>
 
-<file path=ppt/slides/slide39.xml><?xml version="1.0" encoding="utf-8"?>
+<file path=ppt/slides/slide4.xml><?xml version="1.0" encoding="utf-8"?>
+<p:sld xmlns:a="http://schemas.openxmlformats.org/drawingml/2006/main" xmlns:r="http://schemas.openxmlformats.org/officeDocument/2006/relationships" xmlns:p="http://schemas.openxmlformats.org/presentationml/2006/main">
+  <p:cSld>
+    <p:spTree>
+      <p:nvGrpSpPr>
+        <p:cNvPr id="1" name=""/>
+        <p:cNvGrpSpPr/>
+        <p:nvPr/>
+      </p:nvGrpSpPr>
+      <p:grpSpPr>
+        <a:xfrm>
+          <a:off x="0" y="0"/>
+          <a:ext cx="0" cy="0"/>
+          <a:chOff x="0" y="0"/>
+          <a:chExt cx="0" cy="0"/>
+        </a:xfrm>
+      </p:grpSpPr>
+      <p:graphicFrame>
+        <p:nvGraphicFramePr>
+          <p:cNvPr id="5" name="Diagram 4">
+            <a:extLst>
+              <a:ext uri="{FF2B5EF4-FFF2-40B4-BE49-F238E27FC236}">
+                <a16:creationId xmlns:a16="http://schemas.microsoft.com/office/drawing/2014/main" id="{D709FF4F-E8DD-9A4C-AA4A-F6BBA6A070CE}"/>
+              </a:ext>
+            </a:extLst>
+          </p:cNvPr>
+          <p:cNvGraphicFramePr/>
+          <p:nvPr/>
+        </p:nvGraphicFramePr>
+        <p:xfrm>
+          <a:off x="890385" y="0"/>
+          <a:ext cx="10411230" cy="6841375"/>
+        </p:xfrm>
+        <a:graphic>
+          <a:graphicData uri="http://schemas.openxmlformats.org/drawingml/2006/diagram">
+            <dgm:relIds xmlns:dgm="http://schemas.openxmlformats.org/drawingml/2006/diagram" xmlns:r="http://schemas.openxmlformats.org/officeDocument/2006/relationships" r:dm="rId3" r:lo="rId4" r:qs="rId5" r:cs="rId6"/>
+          </a:graphicData>
+        </a:graphic>
+      </p:graphicFrame>
+    </p:spTree>
+    <p:extLst>
+      <p:ext uri="{BB962C8B-B14F-4D97-AF65-F5344CB8AC3E}">
+        <p14:creationId xmlns:p14="http://schemas.microsoft.com/office/powerpoint/2010/main" val="3768086851"/>
+      </p:ext>
+    </p:extLst>
+  </p:cSld>
+  <p:clrMapOvr>
+    <a:masterClrMapping/>
+  </p:clrMapOvr>
+</p:sld>
+</file>
+
+<file path=ppt/slides/slide40.xml><?xml version="1.0" encoding="utf-8"?>
 <p:sld xmlns:a="http://schemas.openxmlformats.org/drawingml/2006/main" xmlns:r="http://schemas.openxmlformats.org/officeDocument/2006/relationships" xmlns:p="http://schemas.openxmlformats.org/presentationml/2006/main" show="0">
   <p:cSld>
     <p:spTree>
@@ -20852,133 +21232,6 @@
 </p:sld>
 </file>
 
-<file path=ppt/slides/slide4.xml><?xml version="1.0" encoding="utf-8"?>
-<p:sld xmlns:a="http://schemas.openxmlformats.org/drawingml/2006/main" xmlns:r="http://schemas.openxmlformats.org/officeDocument/2006/relationships" xmlns:p="http://schemas.openxmlformats.org/presentationml/2006/main">
-  <p:cSld>
-    <p:spTree>
-      <p:nvGrpSpPr>
-        <p:cNvPr id="1" name=""/>
-        <p:cNvGrpSpPr/>
-        <p:nvPr/>
-      </p:nvGrpSpPr>
-      <p:grpSpPr>
-        <a:xfrm>
-          <a:off x="0" y="0"/>
-          <a:ext cx="0" cy="0"/>
-          <a:chOff x="0" y="0"/>
-          <a:chExt cx="0" cy="0"/>
-        </a:xfrm>
-      </p:grpSpPr>
-      <p:sp>
-        <p:nvSpPr>
-          <p:cNvPr id="2" name="Title 1">
-            <a:extLst>
-              <a:ext uri="{FF2B5EF4-FFF2-40B4-BE49-F238E27FC236}">
-                <a16:creationId xmlns:a16="http://schemas.microsoft.com/office/drawing/2014/main" id="{9512DE3D-DBF9-074E-BF43-551FDC102FE6}"/>
-              </a:ext>
-            </a:extLst>
-          </p:cNvPr>
-          <p:cNvSpPr>
-            <a:spLocks noGrp="1"/>
-          </p:cNvSpPr>
-          <p:nvPr>
-            <p:ph type="title"/>
-          </p:nvPr>
-        </p:nvSpPr>
-        <p:spPr/>
-        <p:txBody>
-          <a:bodyPr/>
-          <a:lstStyle/>
-          <a:p>
-            <a:r>
-              <a:rPr lang="en-US" dirty="0"/>
-              <a:t>Describe</a:t>
-            </a:r>
-          </a:p>
-        </p:txBody>
-      </p:sp>
-      <p:sp>
-        <p:nvSpPr>
-          <p:cNvPr id="3" name="Content Placeholder 2">
-            <a:extLst>
-              <a:ext uri="{FF2B5EF4-FFF2-40B4-BE49-F238E27FC236}">
-                <a16:creationId xmlns:a16="http://schemas.microsoft.com/office/drawing/2014/main" id="{625EDB29-19BF-584B-B754-8E179DE202DC}"/>
-              </a:ext>
-            </a:extLst>
-          </p:cNvPr>
-          <p:cNvSpPr>
-            <a:spLocks noGrp="1"/>
-          </p:cNvSpPr>
-          <p:nvPr>
-            <p:ph idx="1"/>
-          </p:nvPr>
-        </p:nvSpPr>
-        <p:spPr/>
-        <p:txBody>
-          <a:bodyPr>
-            <a:normAutofit/>
-          </a:bodyPr>
-          <a:lstStyle/>
-          <a:p>
-            <a:r>
-              <a:rPr lang="en-US" dirty="0"/>
-              <a:t>Not necessarily looking for associations.</a:t>
-            </a:r>
-          </a:p>
-          <a:p>
-            <a:r>
-              <a:rPr lang="en-US" dirty="0"/>
-              <a:t>Distributions (i.e., middle, spread, shape, proportion of people in each category) of single variables.</a:t>
-            </a:r>
-          </a:p>
-          <a:p>
-            <a:r>
-              <a:rPr lang="en-US" dirty="0"/>
-              <a:t>Resource management and planning.</a:t>
-            </a:r>
-          </a:p>
-          <a:p>
-            <a:r>
-              <a:rPr lang="en-US" dirty="0"/>
-              <a:t>Examples:</a:t>
-            </a:r>
-          </a:p>
-          <a:p>
-            <a:pPr lvl="1"/>
-            <a:r>
-              <a:rPr lang="en-US" dirty="0"/>
-              <a:t>How many ventilators are available in Texas?</a:t>
-            </a:r>
-          </a:p>
-          <a:p>
-            <a:pPr lvl="1"/>
-            <a:r>
-              <a:rPr lang="en-US" dirty="0"/>
-              <a:t>What is the average age of people living in Florida?</a:t>
-            </a:r>
-          </a:p>
-          <a:p>
-            <a:pPr lvl="1"/>
-            <a:r>
-              <a:rPr lang="en-US" dirty="0"/>
-              <a:t>How much time elapses, on average, between exposure to a pathogen and occurrence of disease symptoms.</a:t>
-            </a:r>
-          </a:p>
-        </p:txBody>
-      </p:sp>
-    </p:spTree>
-    <p:extLst>
-      <p:ext uri="{BB962C8B-B14F-4D97-AF65-F5344CB8AC3E}">
-        <p14:creationId xmlns:p14="http://schemas.microsoft.com/office/powerpoint/2010/main" val="3140921434"/>
-      </p:ext>
-    </p:extLst>
-  </p:cSld>
-  <p:clrMapOvr>
-    <a:masterClrMapping/>
-  </p:clrMapOvr>
-</p:sld>
-</file>
-
 <file path=ppt/slides/slide5.xml><?xml version="1.0" encoding="utf-8"?>
 <p:sld xmlns:a="http://schemas.openxmlformats.org/drawingml/2006/main" xmlns:r="http://schemas.openxmlformats.org/officeDocument/2006/relationships" xmlns:p="http://schemas.openxmlformats.org/presentationml/2006/main">
   <p:cSld>
@@ -21049,13 +21302,13 @@
           <a:p>
             <a:r>
               <a:rPr lang="en-US" dirty="0"/>
-              <a:t>But, sometimes looking for associations.</a:t>
+              <a:t>Not necessarily looking for associations.</a:t>
             </a:r>
           </a:p>
           <a:p>
             <a:r>
               <a:rPr lang="en-US" dirty="0"/>
-              <a:t>Comparing distributions of single variables within levels of another variable.</a:t>
+              <a:t>Distributions (i.e., middle, spread, shape, proportion of people in each category) of single variables.</a:t>
             </a:r>
           </a:p>
           <a:p>
@@ -21074,21 +21327,21 @@
             <a:pPr lvl="1"/>
             <a:r>
               <a:rPr lang="en-US" dirty="0"/>
-              <a:t>Are there more ventilators available in Texas or New York?</a:t>
+              <a:t>How many ventilators are available in Texas?</a:t>
             </a:r>
           </a:p>
           <a:p>
             <a:pPr lvl="1"/>
             <a:r>
               <a:rPr lang="en-US" dirty="0"/>
-              <a:t>Are people older, on average, in Florida or Pennsylvania?</a:t>
+              <a:t>What is the average age of people living in Florida?</a:t>
             </a:r>
           </a:p>
           <a:p>
             <a:pPr lvl="1"/>
             <a:r>
               <a:rPr lang="en-US" dirty="0"/>
-              <a:t>Is symptom onset quicker, on average, for Cholera or E. coli?</a:t>
+              <a:t>How much time elapses, on average, between exposure to a pathogen and occurrence of disease symptoms.</a:t>
             </a:r>
           </a:p>
         </p:txBody>
@@ -21096,7 +21349,7 @@
     </p:spTree>
     <p:extLst>
       <p:ext uri="{BB962C8B-B14F-4D97-AF65-F5344CB8AC3E}">
-        <p14:creationId xmlns:p14="http://schemas.microsoft.com/office/powerpoint/2010/main" val="173096645"/>
+        <p14:creationId xmlns:p14="http://schemas.microsoft.com/office/powerpoint/2010/main" val="3140921434"/>
       </p:ext>
     </p:extLst>
   </p:cSld>
@@ -21169,45 +21422,53 @@
         </p:nvSpPr>
         <p:spPr/>
         <p:txBody>
-          <a:bodyPr/>
+          <a:bodyPr>
+            <a:normAutofit/>
+          </a:bodyPr>
           <a:lstStyle/>
           <a:p>
             <a:r>
               <a:rPr lang="en-US" dirty="0"/>
-              <a:t>Measures of disease occurrence.</a:t>
+              <a:t>But, sometimes looking for associations.</a:t>
+            </a:r>
+          </a:p>
+          <a:p>
+            <a:r>
+              <a:rPr lang="en-US" dirty="0"/>
+              <a:t>Comparing distributions of single variables within levels of another variable.</a:t>
+            </a:r>
+          </a:p>
+          <a:p>
+            <a:r>
+              <a:rPr lang="en-US" dirty="0"/>
+              <a:t>Resource management and planning.</a:t>
+            </a:r>
+          </a:p>
+          <a:p>
+            <a:r>
+              <a:rPr lang="en-US" dirty="0"/>
+              <a:t>Examples:</a:t>
             </a:r>
           </a:p>
           <a:p>
             <a:pPr lvl="1"/>
             <a:r>
               <a:rPr lang="en-US" dirty="0"/>
-              <a:t>Incidence</a:t>
+              <a:t>Are there more ventilators available in Texas or New York?</a:t>
             </a:r>
           </a:p>
           <a:p>
             <a:pPr lvl="1"/>
             <a:r>
               <a:rPr lang="en-US" dirty="0"/>
-              <a:t>Prevalence</a:t>
+              <a:t>Are people older, on average, in Florida or Pennsylvania?</a:t>
             </a:r>
           </a:p>
           <a:p>
             <a:pPr lvl="1"/>
             <a:r>
               <a:rPr lang="en-US" dirty="0"/>
-              <a:t>Odds</a:t>
-            </a:r>
-          </a:p>
-          <a:p>
-            <a:r>
-              <a:rPr lang="en-US" dirty="0"/>
-              <a:t>Can be useful on their own.</a:t>
-            </a:r>
-          </a:p>
-          <a:p>
-            <a:r>
-              <a:rPr lang="en-US" dirty="0"/>
-              <a:t>Can be useful for hypothesis generation.</a:t>
+              <a:t>Is symptom onset quicker, on average, for Cholera or E. coli?</a:t>
             </a:r>
           </a:p>
         </p:txBody>
@@ -21215,7 +21476,7 @@
     </p:spTree>
     <p:extLst>
       <p:ext uri="{BB962C8B-B14F-4D97-AF65-F5344CB8AC3E}">
-        <p14:creationId xmlns:p14="http://schemas.microsoft.com/office/powerpoint/2010/main" val="3528684942"/>
+        <p14:creationId xmlns:p14="http://schemas.microsoft.com/office/powerpoint/2010/main" val="173096645"/>
       </p:ext>
     </p:extLst>
   </p:cSld>
@@ -21247,7 +21508,7 @@
           <p:cNvPr id="2" name="Title 1">
             <a:extLst>
               <a:ext uri="{FF2B5EF4-FFF2-40B4-BE49-F238E27FC236}">
-                <a16:creationId xmlns:a16="http://schemas.microsoft.com/office/drawing/2014/main" id="{D6CEF004-6FA2-2B4C-A7D4-9FE1D55D54E3}"/>
+                <a16:creationId xmlns:a16="http://schemas.microsoft.com/office/drawing/2014/main" id="{9512DE3D-DBF9-074E-BF43-551FDC102FE6}"/>
               </a:ext>
             </a:extLst>
           </p:cNvPr>
@@ -21265,7 +21526,7 @@
           <a:p>
             <a:r>
               <a:rPr lang="en-US" dirty="0"/>
-              <a:t>Prediction</a:t>
+              <a:t>Describe</a:t>
             </a:r>
           </a:p>
         </p:txBody>
@@ -21275,7 +21536,7 @@
           <p:cNvPr id="3" name="Content Placeholder 2">
             <a:extLst>
               <a:ext uri="{FF2B5EF4-FFF2-40B4-BE49-F238E27FC236}">
-                <a16:creationId xmlns:a16="http://schemas.microsoft.com/office/drawing/2014/main" id="{293C1495-F7DB-D94C-8997-52357CAEE529}"/>
+                <a16:creationId xmlns:a16="http://schemas.microsoft.com/office/drawing/2014/main" id="{625EDB29-19BF-584B-B754-8E179DE202DC}"/>
               </a:ext>
             </a:extLst>
           </p:cNvPr>
@@ -21293,19 +21554,48 @@
           <a:p>
             <a:r>
               <a:rPr lang="en-US" dirty="0"/>
-              <a:t>Implies associations.</a:t>
+              <a:t>Measures of disease occurrence.</a:t>
             </a:r>
           </a:p>
           <a:p>
             <a:pPr lvl="1"/>
-            <a:endParaRPr lang="en-US" dirty="0"/>
+            <a:r>
+              <a:rPr lang="en-US" dirty="0"/>
+              <a:t>Incidence</a:t>
+            </a:r>
+          </a:p>
+          <a:p>
+            <a:pPr lvl="1"/>
+            <a:r>
+              <a:rPr lang="en-US" dirty="0"/>
+              <a:t>Prevalence</a:t>
+            </a:r>
+          </a:p>
+          <a:p>
+            <a:pPr lvl="1"/>
+            <a:r>
+              <a:rPr lang="en-US" dirty="0"/>
+              <a:t>Odds</a:t>
+            </a:r>
+          </a:p>
+          <a:p>
+            <a:r>
+              <a:rPr lang="en-US" dirty="0"/>
+              <a:t>Can be useful on their own.</a:t>
+            </a:r>
+          </a:p>
+          <a:p>
+            <a:r>
+              <a:rPr lang="en-US" dirty="0"/>
+              <a:t>Can be useful for hypothesis generation.</a:t>
+            </a:r>
           </a:p>
         </p:txBody>
       </p:sp>
     </p:spTree>
     <p:extLst>
       <p:ext uri="{BB962C8B-B14F-4D97-AF65-F5344CB8AC3E}">
-        <p14:creationId xmlns:p14="http://schemas.microsoft.com/office/powerpoint/2010/main" val="538960976"/>
+        <p14:creationId xmlns:p14="http://schemas.microsoft.com/office/powerpoint/2010/main" val="3528684942"/>
       </p:ext>
     </p:extLst>
   </p:cSld>
@@ -21337,7 +21627,7 @@
           <p:cNvPr id="2" name="Title 1">
             <a:extLst>
               <a:ext uri="{FF2B5EF4-FFF2-40B4-BE49-F238E27FC236}">
-                <a16:creationId xmlns:a16="http://schemas.microsoft.com/office/drawing/2014/main" id="{9D01D5EA-B5BE-5D46-9E70-9EFF237DCCBD}"/>
+                <a16:creationId xmlns:a16="http://schemas.microsoft.com/office/drawing/2014/main" id="{D6CEF004-6FA2-2B4C-A7D4-9FE1D55D54E3}"/>
               </a:ext>
             </a:extLst>
           </p:cNvPr>
@@ -21355,7 +21645,7 @@
           <a:p>
             <a:r>
               <a:rPr lang="en-US" dirty="0"/>
-              <a:t>Association</a:t>
+              <a:t>Prediction</a:t>
             </a:r>
           </a:p>
         </p:txBody>
@@ -21365,7 +21655,7 @@
           <p:cNvPr id="3" name="Content Placeholder 2">
             <a:extLst>
               <a:ext uri="{FF2B5EF4-FFF2-40B4-BE49-F238E27FC236}">
-                <a16:creationId xmlns:a16="http://schemas.microsoft.com/office/drawing/2014/main" id="{6F600F65-5453-CA4C-B071-E5C07463BA74}"/>
+                <a16:creationId xmlns:a16="http://schemas.microsoft.com/office/drawing/2014/main" id="{293C1495-F7DB-D94C-8997-52357CAEE529}"/>
               </a:ext>
             </a:extLst>
           </p:cNvPr>
@@ -21383,21 +21673,19 @@
           <a:p>
             <a:r>
               <a:rPr lang="en-US" dirty="0"/>
-              <a:t>The distribution (i.e., middle, spread, shape, proportion of people in each category) of the thing we are measuring is different, on average, in two groups.</a:t>
-            </a:r>
-          </a:p>
-          <a:p>
-            <a:r>
-              <a:rPr lang="en-US" dirty="0"/>
-              <a:t>Knowing something about X tells you something about Y.</a:t>
-            </a:r>
+              <a:t>Implies associations.</a:t>
+            </a:r>
+          </a:p>
+          <a:p>
+            <a:pPr lvl="1"/>
+            <a:endParaRPr lang="en-US" dirty="0"/>
           </a:p>
         </p:txBody>
       </p:sp>
     </p:spTree>
     <p:extLst>
       <p:ext uri="{BB962C8B-B14F-4D97-AF65-F5344CB8AC3E}">
-        <p14:creationId xmlns:p14="http://schemas.microsoft.com/office/powerpoint/2010/main" val="771283089"/>
+        <p14:creationId xmlns:p14="http://schemas.microsoft.com/office/powerpoint/2010/main" val="538960976"/>
       </p:ext>
     </p:extLst>
   </p:cSld>
@@ -21429,7 +21717,7 @@
           <p:cNvPr id="2" name="Title 1">
             <a:extLst>
               <a:ext uri="{FF2B5EF4-FFF2-40B4-BE49-F238E27FC236}">
-                <a16:creationId xmlns:a16="http://schemas.microsoft.com/office/drawing/2014/main" id="{D6CEF004-6FA2-2B4C-A7D4-9FE1D55D54E3}"/>
+                <a16:creationId xmlns:a16="http://schemas.microsoft.com/office/drawing/2014/main" id="{9D01D5EA-B5BE-5D46-9E70-9EFF237DCCBD}"/>
               </a:ext>
             </a:extLst>
           </p:cNvPr>
@@ -21447,7 +21735,7 @@
           <a:p>
             <a:r>
               <a:rPr lang="en-US" dirty="0"/>
-              <a:t>Prediction</a:t>
+              <a:t>Association</a:t>
             </a:r>
           </a:p>
         </p:txBody>
@@ -21457,7 +21745,7 @@
           <p:cNvPr id="3" name="Content Placeholder 2">
             <a:extLst>
               <a:ext uri="{FF2B5EF4-FFF2-40B4-BE49-F238E27FC236}">
-                <a16:creationId xmlns:a16="http://schemas.microsoft.com/office/drawing/2014/main" id="{293C1495-F7DB-D94C-8997-52357CAEE529}"/>
+                <a16:creationId xmlns:a16="http://schemas.microsoft.com/office/drawing/2014/main" id="{6F600F65-5453-CA4C-B071-E5C07463BA74}"/>
               </a:ext>
             </a:extLst>
           </p:cNvPr>
@@ -21470,80 +21758,26 @@
         </p:nvSpPr>
         <p:spPr/>
         <p:txBody>
-          <a:bodyPr>
-            <a:normAutofit lnSpcReduction="10000"/>
-          </a:bodyPr>
+          <a:bodyPr/>
           <a:lstStyle/>
           <a:p>
             <a:r>
               <a:rPr lang="en-US" dirty="0"/>
-              <a:t>Implies associations.</a:t>
+              <a:t>The distribution (i.e., middle, spread, shape, proportion of people in each category) of the thing we are measuring is different, on average, in two groups.</a:t>
             </a:r>
           </a:p>
           <a:p>
             <a:r>
               <a:rPr lang="en-US" dirty="0"/>
-              <a:t>Examples</a:t>
-            </a:r>
-          </a:p>
-          <a:p>
-            <a:pPr lvl="1"/>
-            <a:r>
-              <a:rPr lang="en-US" dirty="0"/>
-              <a:t>People of a certain race/ethnicity are more likely to get a particular cancer.</a:t>
-            </a:r>
-          </a:p>
-          <a:p>
-            <a:pPr lvl="1"/>
-            <a:r>
-              <a:rPr lang="en-US" dirty="0"/>
-              <a:t>Older adults who have trouble managing finances are more likely to get dementia.</a:t>
-            </a:r>
-          </a:p>
-          <a:p>
-            <a:r>
-              <a:rPr lang="en-US" dirty="0"/>
-              <a:t>Can be useful on its own.</a:t>
-            </a:r>
-          </a:p>
-          <a:p>
-            <a:r>
-              <a:rPr lang="en-US" dirty="0"/>
-              <a:t>Often, in epidemiology, the ultimate goal is causal inference.</a:t>
-            </a:r>
-          </a:p>
-          <a:p>
-            <a:r>
-              <a:rPr lang="en-US" dirty="0"/>
-              <a:t>“the study of the occurrence and distribution of health-related states or events in specified populations, including the study of the determinants influencing such states, </a:t>
-            </a:r>
-            <a:r>
-              <a:rPr lang="en-US" u="sng" dirty="0"/>
-              <a:t>and the application of this knowledge to control the health problems.</a:t>
-            </a:r>
-            <a:r>
-              <a:rPr lang="en-US" dirty="0"/>
-              <a:t>” </a:t>
-            </a:r>
-            <a:r>
-              <a:rPr lang="en-US" u="sng" dirty="0"/>
-              <a:t>(Porta 2008, page 81)</a:t>
-            </a:r>
-            <a:endParaRPr lang="en-US" dirty="0"/>
-          </a:p>
-          <a:p>
-            <a:endParaRPr lang="en-US" dirty="0"/>
-          </a:p>
-          <a:p>
-            <a:pPr lvl="1"/>
-            <a:endParaRPr lang="en-US" dirty="0"/>
+              <a:t>Knowing something about X tells you something about Y.</a:t>
+            </a:r>
           </a:p>
         </p:txBody>
       </p:sp>
     </p:spTree>
     <p:extLst>
       <p:ext uri="{BB962C8B-B14F-4D97-AF65-F5344CB8AC3E}">
-        <p14:creationId xmlns:p14="http://schemas.microsoft.com/office/powerpoint/2010/main" val="1469833745"/>
+        <p14:creationId xmlns:p14="http://schemas.microsoft.com/office/powerpoint/2010/main" val="771283089"/>
       </p:ext>
     </p:extLst>
   </p:cSld>
@@ -22339,15 +22573,6 @@
 </file>
 
 <file path=customXml/item2.xml><?xml version="1.0" encoding="utf-8"?>
-<?mso-contentType ?>
-<FormTemplates xmlns="http://schemas.microsoft.com/sharepoint/v3/contenttype/forms">
-  <Display>DocumentLibraryForm</Display>
-  <Edit>DocumentLibraryForm</Edit>
-  <New>DocumentLibraryForm</New>
-</FormTemplates>
-</file>
-
-<file path=customXml/item3.xml><?xml version="1.0" encoding="utf-8"?>
 <p:properties xmlns:p="http://schemas.microsoft.com/office/2006/metadata/properties" xmlns:xsi="http://www.w3.org/2001/XMLSchema-instance" xmlns:pc="http://schemas.microsoft.com/office/infopath/2007/PartnerControls">
   <documentManagement>
     <lcf76f155ced4ddcb4097134ff3c332f xmlns="e3793ca1-6164-4dfb-aaf8-0aa60c0c70c2">
@@ -22358,14 +22583,55 @@
 </p:properties>
 </file>
 
+<file path=customXml/item3.xml><?xml version="1.0" encoding="utf-8"?>
+<?mso-contentType ?>
+<FormTemplates xmlns="http://schemas.microsoft.com/sharepoint/v3/contenttype/forms">
+  <Display>DocumentLibraryForm</Display>
+  <Edit>DocumentLibraryForm</Edit>
+  <New>DocumentLibraryForm</New>
+</FormTemplates>
+</file>
+
 <file path=customXml/itemProps1.xml><?xml version="1.0" encoding="utf-8"?>
-<ds:datastoreItem xmlns:ds="http://schemas.openxmlformats.org/officeDocument/2006/customXml" ds:itemID="{3CF10D19-C2DE-4DA0-A919-8C20BF6D3892}"/>
+<ds:datastoreItem xmlns:ds="http://schemas.openxmlformats.org/officeDocument/2006/customXml" ds:itemID="{3CF10D19-C2DE-4DA0-A919-8C20BF6D3892}">
+  <ds:schemaRefs>
+    <ds:schemaRef ds:uri="http://schemas.microsoft.com/office/2006/metadata/contentType"/>
+    <ds:schemaRef ds:uri="http://schemas.microsoft.com/office/2006/metadata/properties/metaAttributes"/>
+    <ds:schemaRef ds:uri="http://www.w3.org/2001/XMLSchema"/>
+    <ds:schemaRef ds:uri="http://schemas.microsoft.com/office/2006/metadata/properties"/>
+    <ds:schemaRef ds:uri="e3793ca1-6164-4dfb-aaf8-0aa60c0c70c2"/>
+    <ds:schemaRef ds:uri="b3558f30-ae73-4668-947b-5578bd4f9b3c"/>
+    <ds:schemaRef ds:uri="http://schemas.microsoft.com/office/2006/documentManagement/types"/>
+    <ds:schemaRef ds:uri="http://schemas.microsoft.com/office/infopath/2007/PartnerControls"/>
+    <ds:schemaRef ds:uri="http://schemas.openxmlformats.org/package/2006/metadata/core-properties"/>
+    <ds:schemaRef ds:uri="http://purl.org/dc/elements/1.1/"/>
+    <ds:schemaRef ds:uri="http://purl.org/dc/terms/"/>
+    <ds:schemaRef ds:uri="http://schemas.microsoft.com/internal/obd"/>
+  </ds:schemaRefs>
+</ds:datastoreItem>
 </file>
 
 <file path=customXml/itemProps2.xml><?xml version="1.0" encoding="utf-8"?>
-<ds:datastoreItem xmlns:ds="http://schemas.openxmlformats.org/officeDocument/2006/customXml" ds:itemID="{E1D4919A-BAF3-4AE4-9F7A-40F7560C4A6C}"/>
+<ds:datastoreItem xmlns:ds="http://schemas.openxmlformats.org/officeDocument/2006/customXml" ds:itemID="{51782BA8-3A3F-4079-A302-D5F880984651}">
+  <ds:schemaRefs>
+    <ds:schemaRef ds:uri="http://schemas.openxmlformats.org/package/2006/metadata/core-properties"/>
+    <ds:schemaRef ds:uri="http://purl.org/dc/dcmitype/"/>
+    <ds:schemaRef ds:uri="http://schemas.microsoft.com/office/2006/metadata/properties"/>
+    <ds:schemaRef ds:uri="http://schemas.microsoft.com/office/2006/documentManagement/types"/>
+    <ds:schemaRef ds:uri="e3793ca1-6164-4dfb-aaf8-0aa60c0c70c2"/>
+    <ds:schemaRef ds:uri="http://purl.org/dc/terms/"/>
+    <ds:schemaRef ds:uri="http://purl.org/dc/elements/1.1/"/>
+    <ds:schemaRef ds:uri="http://schemas.microsoft.com/office/infopath/2007/PartnerControls"/>
+    <ds:schemaRef ds:uri="b3558f30-ae73-4668-947b-5578bd4f9b3c"/>
+    <ds:schemaRef ds:uri="http://www.w3.org/XML/1998/namespace"/>
+  </ds:schemaRefs>
+</ds:datastoreItem>
 </file>
 
 <file path=customXml/itemProps3.xml><?xml version="1.0" encoding="utf-8"?>
-<ds:datastoreItem xmlns:ds="http://schemas.openxmlformats.org/officeDocument/2006/customXml" ds:itemID="{51782BA8-3A3F-4079-A302-D5F880984651}"/>
+<ds:datastoreItem xmlns:ds="http://schemas.openxmlformats.org/officeDocument/2006/customXml" ds:itemID="{E1D4919A-BAF3-4AE4-9F7A-40F7560C4A6C}">
+  <ds:schemaRefs>
+    <ds:schemaRef ds:uri="http://schemas.microsoft.com/sharepoint/v3/contenttype/forms"/>
+  </ds:schemaRefs>
+</ds:datastoreItem>
 </file>
</xml_diff>